<commit_message>
More xunit dependencies added Change generation to pascal case
</commit_message>
<xml_diff>
--- a/BCC2015_BDD-ES.pptx
+++ b/BCC2015_BDD-ES.pptx
@@ -5,21 +5,22 @@
     <p:sldMasterId id="2147483660" r:id="rId1"/>
   </p:sldMasterIdLst>
   <p:notesMasterIdLst>
-    <p:notesMasterId r:id="rId14"/>
+    <p:notesMasterId r:id="rId15"/>
   </p:notesMasterIdLst>
   <p:sldIdLst>
     <p:sldId id="256" r:id="rId2"/>
     <p:sldId id="257" r:id="rId3"/>
     <p:sldId id="289" r:id="rId4"/>
-    <p:sldId id="291" r:id="rId5"/>
-    <p:sldId id="292" r:id="rId6"/>
-    <p:sldId id="293" r:id="rId7"/>
-    <p:sldId id="294" r:id="rId8"/>
-    <p:sldId id="295" r:id="rId9"/>
-    <p:sldId id="296" r:id="rId10"/>
-    <p:sldId id="297" r:id="rId11"/>
-    <p:sldId id="290" r:id="rId12"/>
-    <p:sldId id="265" r:id="rId13"/>
+    <p:sldId id="298" r:id="rId5"/>
+    <p:sldId id="291" r:id="rId6"/>
+    <p:sldId id="292" r:id="rId7"/>
+    <p:sldId id="293" r:id="rId8"/>
+    <p:sldId id="294" r:id="rId9"/>
+    <p:sldId id="295" r:id="rId10"/>
+    <p:sldId id="296" r:id="rId11"/>
+    <p:sldId id="297" r:id="rId12"/>
+    <p:sldId id="290" r:id="rId13"/>
+    <p:sldId id="265" r:id="rId14"/>
   </p:sldIdLst>
   <p:sldSz cx="9144000" cy="5486400"/>
   <p:notesSz cx="6858000" cy="9144000"/>
@@ -3613,14 +3614,6 @@
               </a:rPr>
               <a:t>BDD / Exec Specs / VS 2013 </a:t>
             </a:r>
-            <a:endParaRPr lang="en-US" sz="3100" dirty="0">
-              <a:solidFill>
-                <a:schemeClr val="tx2">
-                  <a:lumMod val="75000"/>
-                  <a:lumOff val="25000"/>
-                </a:schemeClr>
-              </a:solidFill>
-            </a:endParaRPr>
           </a:p>
         </p:txBody>
       </p:sp>
@@ -3892,21 +3885,7 @@
                 <a:ea typeface="+mj-ea"/>
                 <a:cs typeface="HelveticaNeueLT Std Thin"/>
               </a:rPr>
-              <a:t>Tommy </a:t>
-            </a:r>
-            <a:r>
-              <a:rPr lang="en-US" sz="3100" cap="all" dirty="0">
-                <a:solidFill>
-                  <a:schemeClr val="tx2">
-                    <a:lumMod val="75000"/>
-                    <a:lumOff val="25000"/>
-                  </a:schemeClr>
-                </a:solidFill>
-                <a:latin typeface="HelveticaNeueLT Std Thin"/>
-                <a:ea typeface="+mj-ea"/>
-                <a:cs typeface="HelveticaNeueLT Std Thin"/>
-              </a:rPr>
-              <a:t>Hinrichs</a:t>
+              <a:t>Tommy Hinrichs</a:t>
             </a:r>
           </a:p>
           <a:p>
@@ -3992,7 +3971,11 @@
           <a:p>
             <a:r>
               <a:rPr lang="en-US" dirty="0" smtClean="0"/>
-              <a:t>Stub code</a:t>
+              <a:t>Specification </a:t>
+            </a:r>
+            <a:r>
+              <a:rPr lang="en-US" dirty="0" smtClean="0"/>
+              <a:t>tips</a:t>
             </a:r>
             <a:endParaRPr lang="en-US" dirty="0"/>
           </a:p>
@@ -4000,7 +3983,7 @@
       </p:sp>
       <p:sp>
         <p:nvSpPr>
-          <p:cNvPr id="5" name="Content Placeholder 4"/>
+          <p:cNvPr id="3" name="Content Placeholder 2"/>
           <p:cNvSpPr>
             <a:spLocks noGrp="1"/>
           </p:cNvSpPr>
@@ -4013,38 +3996,57 @@
           <a:bodyPr/>
           <a:lstStyle/>
           <a:p>
-            <a:endParaRPr lang="en-US"/>
+            <a:r>
+              <a:rPr lang="en-US" dirty="0" smtClean="0"/>
+              <a:t>Specs are for the entire team, including the business</a:t>
+            </a:r>
+          </a:p>
+          <a:p>
+            <a:r>
+              <a:rPr lang="en-US" dirty="0" smtClean="0"/>
+              <a:t>Declarative, not </a:t>
+            </a:r>
+            <a:r>
+              <a:rPr lang="en-US" dirty="0" smtClean="0"/>
+              <a:t>imperative</a:t>
+            </a:r>
+            <a:endParaRPr lang="en-US" dirty="0" smtClean="0"/>
+          </a:p>
+          <a:p>
+            <a:r>
+              <a:rPr lang="en-US" dirty="0" smtClean="0"/>
+              <a:t>The value of English Language specifications is that business and delivery teams are saying the same thing with the same </a:t>
+            </a:r>
+            <a:r>
+              <a:rPr lang="en-US" dirty="0" smtClean="0"/>
+              <a:t>words</a:t>
+            </a:r>
+            <a:endParaRPr lang="en-US" dirty="0" smtClean="0"/>
+          </a:p>
+          <a:p>
+            <a:r>
+              <a:rPr lang="en-US" dirty="0" smtClean="0"/>
+              <a:t>Push the how down </a:t>
+            </a:r>
+            <a:r>
+              <a:rPr lang="en-US" sz="1400" dirty="0" smtClean="0"/>
+              <a:t>[9]</a:t>
+            </a:r>
+          </a:p>
+          <a:p>
+            <a:pPr lvl="1"/>
+            <a:r>
+              <a:rPr lang="en-US" dirty="0" smtClean="0"/>
+              <a:t>How? – Now some code, finally</a:t>
+            </a:r>
+            <a:endParaRPr lang="en-US" dirty="0"/>
           </a:p>
         </p:txBody>
       </p:sp>
-      <p:pic>
-        <p:nvPicPr>
-          <p:cNvPr id="6" name="Picture 5"/>
-          <p:cNvPicPr>
-            <a:picLocks noChangeAspect="1"/>
-          </p:cNvPicPr>
-          <p:nvPr/>
-        </p:nvPicPr>
-        <p:blipFill>
-          <a:blip r:embed="rId2"/>
-          <a:stretch>
-            <a:fillRect/>
-          </a:stretch>
-        </p:blipFill>
-        <p:spPr>
-          <a:xfrm>
-            <a:off x="685800" y="1280161"/>
-            <a:ext cx="4467225" cy="3552825"/>
-          </a:xfrm>
-          <a:prstGeom prst="rect">
-            <a:avLst/>
-          </a:prstGeom>
-        </p:spPr>
-      </p:pic>
     </p:spTree>
     <p:extLst>
       <p:ext uri="{BB962C8B-B14F-4D97-AF65-F5344CB8AC3E}">
-        <p14:creationId xmlns:p14="http://schemas.microsoft.com/office/powerpoint/2010/main" val="3099364567"/>
+        <p14:creationId xmlns:p14="http://schemas.microsoft.com/office/powerpoint/2010/main" val="881461922"/>
       </p:ext>
     </p:extLst>
   </p:cSld>
@@ -4087,537 +4089,51 @@
           <a:lstStyle/>
           <a:p>
             <a:r>
-              <a:rPr lang="en-US" dirty="0" smtClean="0">
-                <a:solidFill>
-                  <a:schemeClr val="tx2">
-                    <a:lumMod val="75000"/>
-                    <a:lumOff val="25000"/>
-                  </a:schemeClr>
-                </a:solidFill>
-              </a:rPr>
-              <a:t>References</a:t>
-            </a:r>
-            <a:endParaRPr lang="en-US" dirty="0">
-              <a:solidFill>
-                <a:schemeClr val="tx2">
-                  <a:lumMod val="75000"/>
-                  <a:lumOff val="25000"/>
-                </a:schemeClr>
-              </a:solidFill>
-            </a:endParaRPr>
+              <a:rPr lang="en-US" dirty="0" smtClean="0"/>
+              <a:t>Stub </a:t>
+            </a:r>
+            <a:r>
+              <a:rPr lang="en-US" dirty="0" smtClean="0"/>
+              <a:t>generated code </a:t>
+            </a:r>
+            <a:endParaRPr lang="en-US" dirty="0"/>
           </a:p>
         </p:txBody>
       </p:sp>
-      <p:sp>
-        <p:nvSpPr>
-          <p:cNvPr id="3" name="Content Placeholder 2"/>
-          <p:cNvSpPr>
-            <a:spLocks noGrp="1"/>
-          </p:cNvSpPr>
-          <p:nvPr>
-            <p:ph idx="1"/>
-          </p:nvPr>
-        </p:nvSpPr>
+      <p:pic>
+        <p:nvPicPr>
+          <p:cNvPr id="6" name="Picture 5"/>
+          <p:cNvPicPr>
+            <a:picLocks noChangeAspect="1"/>
+          </p:cNvPicPr>
+          <p:nvPr/>
+        </p:nvPicPr>
+        <p:blipFill>
+          <a:blip r:embed="rId2"/>
+          <a:stretch>
+            <a:fillRect/>
+          </a:stretch>
+        </p:blipFill>
         <p:spPr>
           <a:xfrm>
             <a:off x="685800" y="1280161"/>
-            <a:ext cx="7147560" cy="2987040"/>
+            <a:ext cx="4467225" cy="3552825"/>
           </a:xfrm>
+          <a:prstGeom prst="rect">
+            <a:avLst/>
+          </a:prstGeom>
         </p:spPr>
-        <p:txBody>
-          <a:bodyPr>
-            <a:normAutofit lnSpcReduction="10000"/>
-          </a:bodyPr>
-          <a:lstStyle/>
-          <a:p>
-            <a:r>
-              <a:rPr lang="en-US" sz="1400" dirty="0">
-                <a:solidFill>
-                  <a:schemeClr val="tx2">
-                    <a:lumMod val="75000"/>
-                    <a:lumOff val="25000"/>
-                  </a:schemeClr>
-                </a:solidFill>
-              </a:rPr>
-              <a:t>[0</a:t>
-            </a:r>
-            <a:r>
-              <a:rPr lang="en-US" sz="1400" dirty="0">
-                <a:solidFill>
-                  <a:schemeClr val="tx2">
-                    <a:lumMod val="75000"/>
-                    <a:lumOff val="25000"/>
-                  </a:schemeClr>
-                </a:solidFill>
-              </a:rPr>
-              <a:t>] - </a:t>
-            </a:r>
-            <a:r>
-              <a:rPr lang="en-US" sz="1400" dirty="0">
-                <a:solidFill>
-                  <a:schemeClr val="tx2">
-                    <a:lumMod val="75000"/>
-                    <a:lumOff val="25000"/>
-                  </a:schemeClr>
-                </a:solidFill>
-                <a:hlinkClick r:id="rId2"/>
-              </a:rPr>
-              <a:t>http://en.wikipedia.org/wiki/Behavior-driven_development</a:t>
-            </a:r>
-            <a:endParaRPr lang="en-US" sz="1400" dirty="0" smtClean="0">
-              <a:solidFill>
-                <a:schemeClr val="tx2">
-                  <a:lumMod val="75000"/>
-                  <a:lumOff val="25000"/>
-                </a:schemeClr>
-              </a:solidFill>
-            </a:endParaRPr>
-          </a:p>
-          <a:p>
-            <a:r>
-              <a:rPr lang="en-US" sz="1400" dirty="0" smtClean="0">
-                <a:solidFill>
-                  <a:schemeClr val="tx2">
-                    <a:lumMod val="75000"/>
-                    <a:lumOff val="25000"/>
-                  </a:schemeClr>
-                </a:solidFill>
-              </a:rPr>
-              <a:t>[1] </a:t>
-            </a:r>
-            <a:r>
-              <a:rPr lang="en-US" sz="1400" dirty="0">
-                <a:solidFill>
-                  <a:schemeClr val="tx2">
-                    <a:lumMod val="75000"/>
-                    <a:lumOff val="25000"/>
-                  </a:schemeClr>
-                </a:solidFill>
-              </a:rPr>
-              <a:t>- </a:t>
-            </a:r>
-            <a:r>
-              <a:rPr lang="en-US" sz="1400" dirty="0">
-                <a:solidFill>
-                  <a:schemeClr val="tx2">
-                    <a:lumMod val="75000"/>
-                    <a:lumOff val="25000"/>
-                  </a:schemeClr>
-                </a:solidFill>
-                <a:hlinkClick r:id="rId3"/>
-              </a:rPr>
-              <a:t>http://specificationbyexample.com/key_ideas.html</a:t>
-            </a:r>
-            <a:endParaRPr lang="en-US" sz="1400" dirty="0" smtClean="0"/>
-          </a:p>
-          <a:p>
-            <a:r>
-              <a:rPr lang="en-US" sz="1400" dirty="0" smtClean="0">
-                <a:solidFill>
-                  <a:schemeClr val="tx2">
-                    <a:lumMod val="75000"/>
-                    <a:lumOff val="25000"/>
-                  </a:schemeClr>
-                </a:solidFill>
-              </a:rPr>
-              <a:t>[2] </a:t>
-            </a:r>
-            <a:r>
-              <a:rPr lang="en-US" sz="1400" dirty="0">
-                <a:solidFill>
-                  <a:schemeClr val="tx2">
-                    <a:lumMod val="75000"/>
-                    <a:lumOff val="25000"/>
-                  </a:schemeClr>
-                </a:solidFill>
-              </a:rPr>
-              <a:t>- </a:t>
-            </a:r>
-            <a:r>
-              <a:rPr lang="en-US" sz="1400" dirty="0">
-                <a:solidFill>
-                  <a:schemeClr val="tx2">
-                    <a:lumMod val="75000"/>
-                    <a:lumOff val="25000"/>
-                  </a:schemeClr>
-                </a:solidFill>
-                <a:hlinkClick r:id="rId4"/>
-              </a:rPr>
-              <a:t>http://</a:t>
-            </a:r>
-            <a:r>
-              <a:rPr lang="en-US" sz="1400" dirty="0" smtClean="0">
-                <a:solidFill>
-                  <a:schemeClr val="tx2">
-                    <a:lumMod val="75000"/>
-                    <a:lumOff val="25000"/>
-                  </a:schemeClr>
-                </a:solidFill>
-                <a:hlinkClick r:id="rId4"/>
-              </a:rPr>
-              <a:t>martinfowler.com/bliki/UbiquitousLanguage.html</a:t>
-            </a:r>
-            <a:endParaRPr lang="en-US" sz="1400" dirty="0" smtClean="0">
-              <a:solidFill>
-                <a:schemeClr val="tx2">
-                  <a:lumMod val="75000"/>
-                  <a:lumOff val="25000"/>
-                </a:schemeClr>
-              </a:solidFill>
-            </a:endParaRPr>
-          </a:p>
-          <a:p>
-            <a:r>
-              <a:rPr lang="en-US" sz="1400" dirty="0">
-                <a:solidFill>
-                  <a:schemeClr val="tx2">
-                    <a:lumMod val="75000"/>
-                    <a:lumOff val="25000"/>
-                  </a:schemeClr>
-                </a:solidFill>
-              </a:rPr>
-              <a:t>[3] - </a:t>
-            </a:r>
-            <a:r>
-              <a:rPr lang="en-US" sz="1400" dirty="0">
-                <a:solidFill>
-                  <a:schemeClr val="tx2">
-                    <a:lumMod val="75000"/>
-                    <a:lumOff val="25000"/>
-                  </a:schemeClr>
-                </a:solidFill>
-                <a:hlinkClick r:id="rId5"/>
-              </a:rPr>
-              <a:t>http://</a:t>
-            </a:r>
-            <a:r>
-              <a:rPr lang="en-US" sz="1400" dirty="0" smtClean="0">
-                <a:solidFill>
-                  <a:schemeClr val="tx2">
-                    <a:lumMod val="75000"/>
-                    <a:lumOff val="25000"/>
-                  </a:schemeClr>
-                </a:solidFill>
-                <a:hlinkClick r:id="rId5"/>
-              </a:rPr>
-              <a:t>martinfowler.com/bliki/DomainSpecificLanguage.html</a:t>
-            </a:r>
-            <a:endParaRPr lang="en-US" sz="1400" dirty="0" smtClean="0">
-              <a:solidFill>
-                <a:schemeClr val="tx2">
-                  <a:lumMod val="75000"/>
-                  <a:lumOff val="25000"/>
-                </a:schemeClr>
-              </a:solidFill>
-            </a:endParaRPr>
-          </a:p>
-          <a:p>
-            <a:r>
-              <a:rPr lang="en-US" sz="1400" dirty="0" smtClean="0">
-                <a:solidFill>
-                  <a:schemeClr val="tx2">
-                    <a:lumMod val="75000"/>
-                    <a:lumOff val="25000"/>
-                  </a:schemeClr>
-                </a:solidFill>
-              </a:rPr>
-              <a:t>[4] </a:t>
-            </a:r>
-            <a:r>
-              <a:rPr lang="en-US" sz="1400" dirty="0">
-                <a:solidFill>
-                  <a:schemeClr val="tx2">
-                    <a:lumMod val="75000"/>
-                    <a:lumOff val="25000"/>
-                  </a:schemeClr>
-                </a:solidFill>
-              </a:rPr>
-              <a:t>- </a:t>
-            </a:r>
-            <a:r>
-              <a:rPr lang="en-US" sz="1400" dirty="0">
-                <a:solidFill>
-                  <a:schemeClr val="tx2">
-                    <a:lumMod val="75000"/>
-                    <a:lumOff val="25000"/>
-                  </a:schemeClr>
-                </a:solidFill>
-                <a:hlinkClick r:id="rId6"/>
-              </a:rPr>
-              <a:t>http://</a:t>
-            </a:r>
-            <a:r>
-              <a:rPr lang="en-US" sz="1400" dirty="0" smtClean="0">
-                <a:solidFill>
-                  <a:schemeClr val="tx2">
-                    <a:lumMod val="75000"/>
-                    <a:lumOff val="25000"/>
-                  </a:schemeClr>
-                </a:solidFill>
-                <a:hlinkClick r:id="rId6"/>
-              </a:rPr>
-              <a:t>martinfowler.com/bliki/PageObject.html</a:t>
-            </a:r>
-            <a:endParaRPr lang="en-US" sz="1400" dirty="0" smtClean="0">
-              <a:solidFill>
-                <a:schemeClr val="tx2">
-                  <a:lumMod val="75000"/>
-                  <a:lumOff val="25000"/>
-                </a:schemeClr>
-              </a:solidFill>
-            </a:endParaRPr>
-          </a:p>
-          <a:p>
-            <a:r>
-              <a:rPr lang="en-US" sz="1400" dirty="0">
-                <a:solidFill>
-                  <a:schemeClr val="tx2">
-                    <a:lumMod val="75000"/>
-                    <a:lumOff val="25000"/>
-                  </a:schemeClr>
-                </a:solidFill>
-              </a:rPr>
-              <a:t>[5] - </a:t>
-            </a:r>
-            <a:r>
-              <a:rPr lang="en-US" sz="1400" dirty="0">
-                <a:solidFill>
-                  <a:schemeClr val="tx2">
-                    <a:lumMod val="75000"/>
-                    <a:lumOff val="25000"/>
-                  </a:schemeClr>
-                </a:solidFill>
-                <a:hlinkClick r:id="rId7"/>
-              </a:rPr>
-              <a:t>https://</a:t>
-            </a:r>
-            <a:r>
-              <a:rPr lang="en-US" sz="1400" dirty="0" smtClean="0">
-                <a:solidFill>
-                  <a:schemeClr val="tx2">
-                    <a:lumMod val="75000"/>
-                    <a:lumOff val="25000"/>
-                  </a:schemeClr>
-                </a:solidFill>
-                <a:hlinkClick r:id="rId7"/>
-              </a:rPr>
-              <a:t>www.visualstudio.com/en-us/products/visual-studio-community-vs.aspx</a:t>
-            </a:r>
-            <a:endParaRPr lang="en-US" sz="1400" dirty="0" smtClean="0">
-              <a:solidFill>
-                <a:schemeClr val="tx2">
-                  <a:lumMod val="75000"/>
-                  <a:lumOff val="25000"/>
-                </a:schemeClr>
-              </a:solidFill>
-            </a:endParaRPr>
-          </a:p>
-          <a:p>
-            <a:r>
-              <a:rPr lang="en-US" sz="1400" dirty="0">
-                <a:solidFill>
-                  <a:schemeClr val="tx2">
-                    <a:lumMod val="75000"/>
-                    <a:lumOff val="25000"/>
-                  </a:schemeClr>
-                </a:solidFill>
-              </a:rPr>
-              <a:t>[6] - </a:t>
-            </a:r>
-            <a:r>
-              <a:rPr lang="en-US" sz="1400" dirty="0">
-                <a:solidFill>
-                  <a:schemeClr val="tx2">
-                    <a:lumMod val="75000"/>
-                    <a:lumOff val="25000"/>
-                  </a:schemeClr>
-                </a:solidFill>
-                <a:hlinkClick r:id="rId8"/>
-              </a:rPr>
-              <a:t>http://www.specflow.org/documentation/Installation</a:t>
-            </a:r>
-            <a:r>
-              <a:rPr lang="en-US" sz="1400" dirty="0" smtClean="0">
-                <a:solidFill>
-                  <a:schemeClr val="tx2">
-                    <a:lumMod val="75000"/>
-                    <a:lumOff val="25000"/>
-                  </a:schemeClr>
-                </a:solidFill>
-                <a:hlinkClick r:id="rId8"/>
-              </a:rPr>
-              <a:t>/</a:t>
-            </a:r>
-            <a:endParaRPr lang="en-US" sz="1400" dirty="0" smtClean="0">
-              <a:solidFill>
-                <a:schemeClr val="tx2">
-                  <a:lumMod val="75000"/>
-                  <a:lumOff val="25000"/>
-                </a:schemeClr>
-              </a:solidFill>
-            </a:endParaRPr>
-          </a:p>
-          <a:p>
-            <a:r>
-              <a:rPr lang="en-US" sz="1400" dirty="0" smtClean="0">
-                <a:solidFill>
-                  <a:schemeClr val="tx2">
-                    <a:lumMod val="75000"/>
-                    <a:lumOff val="25000"/>
-                  </a:schemeClr>
-                </a:solidFill>
-              </a:rPr>
-              <a:t>[7] </a:t>
-            </a:r>
-            <a:r>
-              <a:rPr lang="en-US" sz="1400" dirty="0">
-                <a:solidFill>
-                  <a:schemeClr val="tx2">
-                    <a:lumMod val="75000"/>
-                    <a:lumOff val="25000"/>
-                  </a:schemeClr>
-                </a:solidFill>
-              </a:rPr>
-              <a:t>- </a:t>
-            </a:r>
-            <a:r>
-              <a:rPr lang="en-US" sz="1400" dirty="0">
-                <a:solidFill>
-                  <a:schemeClr val="tx2">
-                    <a:lumMod val="75000"/>
-                    <a:lumOff val="25000"/>
-                  </a:schemeClr>
-                </a:solidFill>
-                <a:hlinkClick r:id="rId9"/>
-              </a:rPr>
-              <a:t>https://github.com/cucumber/cucumber/wiki/Gherkin</a:t>
-            </a:r>
-            <a:endParaRPr lang="en-US" sz="1400" dirty="0" smtClean="0">
-              <a:solidFill>
-                <a:schemeClr val="tx2">
-                  <a:lumMod val="75000"/>
-                  <a:lumOff val="25000"/>
-                </a:schemeClr>
-              </a:solidFill>
-            </a:endParaRPr>
-          </a:p>
-          <a:p>
-            <a:r>
-              <a:rPr lang="en-US" sz="1400" dirty="0" smtClean="0">
-                <a:solidFill>
-                  <a:schemeClr val="tx2">
-                    <a:lumMod val="75000"/>
-                    <a:lumOff val="25000"/>
-                  </a:schemeClr>
-                </a:solidFill>
-              </a:rPr>
-              <a:t>[8] </a:t>
-            </a:r>
-            <a:r>
-              <a:rPr lang="en-US" sz="1400" dirty="0">
-                <a:solidFill>
-                  <a:schemeClr val="tx2">
-                    <a:lumMod val="75000"/>
-                    <a:lumOff val="25000"/>
-                  </a:schemeClr>
-                </a:solidFill>
-              </a:rPr>
-              <a:t>- </a:t>
-            </a:r>
-            <a:r>
-              <a:rPr lang="en-US" sz="1400" dirty="0">
-                <a:solidFill>
-                  <a:schemeClr val="tx2">
-                    <a:lumMod val="75000"/>
-                    <a:lumOff val="25000"/>
-                  </a:schemeClr>
-                </a:solidFill>
-                <a:hlinkClick r:id="rId10"/>
-              </a:rPr>
-              <a:t>https://</a:t>
-            </a:r>
-            <a:r>
-              <a:rPr lang="en-US" sz="1400" dirty="0" smtClean="0">
-                <a:solidFill>
-                  <a:schemeClr val="tx2">
-                    <a:lumMod val="75000"/>
-                    <a:lumOff val="25000"/>
-                  </a:schemeClr>
-                </a:solidFill>
-                <a:hlinkClick r:id="rId10"/>
-              </a:rPr>
-              <a:t>github.com/cucumber/cucumber/wiki/Given-When-Then</a:t>
-            </a:r>
-            <a:endParaRPr lang="en-US" sz="1400" dirty="0" smtClean="0">
-              <a:solidFill>
-                <a:schemeClr val="tx2">
-                  <a:lumMod val="75000"/>
-                  <a:lumOff val="25000"/>
-                </a:schemeClr>
-              </a:solidFill>
-            </a:endParaRPr>
-          </a:p>
-          <a:p>
-            <a:r>
-              <a:rPr lang="en-US" sz="1400" dirty="0">
-                <a:solidFill>
-                  <a:schemeClr val="tx2">
-                    <a:lumMod val="75000"/>
-                    <a:lumOff val="25000"/>
-                  </a:schemeClr>
-                </a:solidFill>
-              </a:rPr>
-              <a:t>[9] -</a:t>
-            </a:r>
-            <a:r>
-              <a:rPr lang="en-US" sz="1400" dirty="0">
-                <a:solidFill>
-                  <a:schemeClr val="tx2">
-                    <a:lumMod val="75000"/>
-                    <a:lumOff val="25000"/>
-                  </a:schemeClr>
-                </a:solidFill>
-                <a:hlinkClick r:id="rId11"/>
-              </a:rPr>
-              <a:t> http://www.marcusoft.net/2013/04/PushTheHowDown.html</a:t>
-            </a:r>
-            <a:endParaRPr lang="en-US" sz="1400" dirty="0" smtClean="0">
-              <a:solidFill>
-                <a:schemeClr val="tx2">
-                  <a:lumMod val="75000"/>
-                  <a:lumOff val="25000"/>
-                </a:schemeClr>
-              </a:solidFill>
-            </a:endParaRPr>
-          </a:p>
-          <a:p>
-            <a:endParaRPr lang="en-US" dirty="0" smtClean="0"/>
-          </a:p>
-          <a:p>
-            <a:endParaRPr lang="en-US" dirty="0"/>
-          </a:p>
-          <a:p>
-            <a:endParaRPr lang="en-US" dirty="0"/>
-          </a:p>
-        </p:txBody>
-      </p:sp>
+      </p:pic>
     </p:spTree>
     <p:extLst>
       <p:ext uri="{BB962C8B-B14F-4D97-AF65-F5344CB8AC3E}">
-        <p14:creationId xmlns:p14="http://schemas.microsoft.com/office/powerpoint/2010/main" val="2156864228"/>
+        <p14:creationId xmlns:p14="http://schemas.microsoft.com/office/powerpoint/2010/main" val="3099364567"/>
       </p:ext>
     </p:extLst>
   </p:cSld>
   <p:clrMapOvr>
     <a:masterClrMapping/>
   </p:clrMapOvr>
-  <p:timing>
-    <p:tnLst>
-      <p:par>
-        <p:cTn id="1" dur="indefinite" restart="never" nodeType="tmRoot"/>
-      </p:par>
-    </p:tnLst>
-  </p:timing>
 </p:sld>
 </file>
 
@@ -4654,9 +4170,619 @@
           <a:lstStyle/>
           <a:p>
             <a:r>
+              <a:rPr lang="en-US" dirty="0" smtClean="0">
+                <a:solidFill>
+                  <a:schemeClr val="tx2">
+                    <a:lumMod val="75000"/>
+                    <a:lumOff val="25000"/>
+                  </a:schemeClr>
+                </a:solidFill>
+              </a:rPr>
+              <a:t>References</a:t>
+            </a:r>
+            <a:endParaRPr lang="en-US" dirty="0">
+              <a:solidFill>
+                <a:schemeClr val="tx2">
+                  <a:lumMod val="75000"/>
+                  <a:lumOff val="25000"/>
+                </a:schemeClr>
+              </a:solidFill>
+            </a:endParaRPr>
+          </a:p>
+        </p:txBody>
+      </p:sp>
+      <p:sp>
+        <p:nvSpPr>
+          <p:cNvPr id="3" name="Content Placeholder 2"/>
+          <p:cNvSpPr>
+            <a:spLocks noGrp="1"/>
+          </p:cNvSpPr>
+          <p:nvPr>
+            <p:ph idx="1"/>
+          </p:nvPr>
+        </p:nvSpPr>
+        <p:spPr>
+          <a:xfrm>
+            <a:off x="685800" y="1280161"/>
+            <a:ext cx="7147560" cy="2987040"/>
+          </a:xfrm>
+        </p:spPr>
+        <p:txBody>
+          <a:bodyPr>
+            <a:normAutofit lnSpcReduction="10000"/>
+          </a:bodyPr>
+          <a:lstStyle/>
+          <a:p>
+            <a:r>
+              <a:rPr lang="en-US" sz="1400" dirty="0">
+                <a:solidFill>
+                  <a:schemeClr val="tx2">
+                    <a:lumMod val="75000"/>
+                    <a:lumOff val="25000"/>
+                  </a:schemeClr>
+                </a:solidFill>
+              </a:rPr>
+              <a:t>[0] - </a:t>
+            </a:r>
+            <a:r>
+              <a:rPr lang="en-US" sz="1400" dirty="0">
+                <a:solidFill>
+                  <a:schemeClr val="tx2">
+                    <a:lumMod val="75000"/>
+                    <a:lumOff val="25000"/>
+                  </a:schemeClr>
+                </a:solidFill>
+                <a:hlinkClick r:id="rId2"/>
+              </a:rPr>
+              <a:t>http://en.wikipedia.org/wiki/Behavior-driven_development</a:t>
+            </a:r>
+            <a:endParaRPr lang="en-US" sz="1400" dirty="0" smtClean="0">
+              <a:solidFill>
+                <a:schemeClr val="tx2">
+                  <a:lumMod val="75000"/>
+                  <a:lumOff val="25000"/>
+                </a:schemeClr>
+              </a:solidFill>
+            </a:endParaRPr>
+          </a:p>
+          <a:p>
+            <a:r>
+              <a:rPr lang="en-US" sz="1400" dirty="0" smtClean="0">
+                <a:solidFill>
+                  <a:schemeClr val="tx2">
+                    <a:lumMod val="75000"/>
+                    <a:lumOff val="25000"/>
+                  </a:schemeClr>
+                </a:solidFill>
+              </a:rPr>
+              <a:t>[1] </a:t>
+            </a:r>
+            <a:r>
+              <a:rPr lang="en-US" sz="1400" dirty="0">
+                <a:solidFill>
+                  <a:schemeClr val="tx2">
+                    <a:lumMod val="75000"/>
+                    <a:lumOff val="25000"/>
+                  </a:schemeClr>
+                </a:solidFill>
+              </a:rPr>
+              <a:t>- </a:t>
+            </a:r>
+            <a:r>
+              <a:rPr lang="en-US" sz="1400" dirty="0">
+                <a:solidFill>
+                  <a:schemeClr val="tx2">
+                    <a:lumMod val="75000"/>
+                    <a:lumOff val="25000"/>
+                  </a:schemeClr>
+                </a:solidFill>
+                <a:hlinkClick r:id="rId3"/>
+              </a:rPr>
+              <a:t>http://specificationbyexample.com/key_ideas.html</a:t>
+            </a:r>
+            <a:endParaRPr lang="en-US" sz="1400" dirty="0" smtClean="0"/>
+          </a:p>
+          <a:p>
+            <a:r>
+              <a:rPr lang="en-US" sz="1400" dirty="0" smtClean="0">
+                <a:solidFill>
+                  <a:schemeClr val="tx2">
+                    <a:lumMod val="75000"/>
+                    <a:lumOff val="25000"/>
+                  </a:schemeClr>
+                </a:solidFill>
+              </a:rPr>
+              <a:t>[2] </a:t>
+            </a:r>
+            <a:r>
+              <a:rPr lang="en-US" sz="1400" dirty="0">
+                <a:solidFill>
+                  <a:schemeClr val="tx2">
+                    <a:lumMod val="75000"/>
+                    <a:lumOff val="25000"/>
+                  </a:schemeClr>
+                </a:solidFill>
+              </a:rPr>
+              <a:t>- </a:t>
+            </a:r>
+            <a:r>
+              <a:rPr lang="en-US" sz="1400" dirty="0">
+                <a:solidFill>
+                  <a:schemeClr val="tx2">
+                    <a:lumMod val="75000"/>
+                    <a:lumOff val="25000"/>
+                  </a:schemeClr>
+                </a:solidFill>
+                <a:hlinkClick r:id="rId4"/>
+              </a:rPr>
+              <a:t>http://</a:t>
+            </a:r>
+            <a:r>
+              <a:rPr lang="en-US" sz="1400" dirty="0" smtClean="0">
+                <a:solidFill>
+                  <a:schemeClr val="tx2">
+                    <a:lumMod val="75000"/>
+                    <a:lumOff val="25000"/>
+                  </a:schemeClr>
+                </a:solidFill>
+                <a:hlinkClick r:id="rId4"/>
+              </a:rPr>
+              <a:t>martinfowler.com/bliki/UbiquitousLanguage.html</a:t>
+            </a:r>
+            <a:endParaRPr lang="en-US" sz="1400" dirty="0" smtClean="0">
+              <a:solidFill>
+                <a:schemeClr val="tx2">
+                  <a:lumMod val="75000"/>
+                  <a:lumOff val="25000"/>
+                </a:schemeClr>
+              </a:solidFill>
+            </a:endParaRPr>
+          </a:p>
+          <a:p>
+            <a:r>
+              <a:rPr lang="en-US" sz="1400" dirty="0">
+                <a:solidFill>
+                  <a:schemeClr val="tx2">
+                    <a:lumMod val="75000"/>
+                    <a:lumOff val="25000"/>
+                  </a:schemeClr>
+                </a:solidFill>
+              </a:rPr>
+              <a:t>[3] - </a:t>
+            </a:r>
+            <a:r>
+              <a:rPr lang="en-US" sz="1400" dirty="0">
+                <a:solidFill>
+                  <a:schemeClr val="tx2">
+                    <a:lumMod val="75000"/>
+                    <a:lumOff val="25000"/>
+                  </a:schemeClr>
+                </a:solidFill>
+                <a:hlinkClick r:id="rId5"/>
+              </a:rPr>
+              <a:t>http://</a:t>
+            </a:r>
+            <a:r>
+              <a:rPr lang="en-US" sz="1400" dirty="0" smtClean="0">
+                <a:solidFill>
+                  <a:schemeClr val="tx2">
+                    <a:lumMod val="75000"/>
+                    <a:lumOff val="25000"/>
+                  </a:schemeClr>
+                </a:solidFill>
+                <a:hlinkClick r:id="rId5"/>
+              </a:rPr>
+              <a:t>martinfowler.com/bliki/DomainSpecificLanguage.html</a:t>
+            </a:r>
+            <a:endParaRPr lang="en-US" sz="1400" dirty="0" smtClean="0">
+              <a:solidFill>
+                <a:schemeClr val="tx2">
+                  <a:lumMod val="75000"/>
+                  <a:lumOff val="25000"/>
+                </a:schemeClr>
+              </a:solidFill>
+            </a:endParaRPr>
+          </a:p>
+          <a:p>
+            <a:r>
+              <a:rPr lang="en-US" sz="1400" dirty="0" smtClean="0">
+                <a:solidFill>
+                  <a:schemeClr val="tx2">
+                    <a:lumMod val="75000"/>
+                    <a:lumOff val="25000"/>
+                  </a:schemeClr>
+                </a:solidFill>
+              </a:rPr>
+              <a:t>[4] </a:t>
+            </a:r>
+            <a:r>
+              <a:rPr lang="en-US" sz="1400" dirty="0">
+                <a:solidFill>
+                  <a:schemeClr val="tx2">
+                    <a:lumMod val="75000"/>
+                    <a:lumOff val="25000"/>
+                  </a:schemeClr>
+                </a:solidFill>
+              </a:rPr>
+              <a:t>- </a:t>
+            </a:r>
+            <a:r>
+              <a:rPr lang="en-US" sz="1400" dirty="0">
+                <a:solidFill>
+                  <a:schemeClr val="tx2">
+                    <a:lumMod val="75000"/>
+                    <a:lumOff val="25000"/>
+                  </a:schemeClr>
+                </a:solidFill>
+                <a:hlinkClick r:id="rId6"/>
+              </a:rPr>
+              <a:t>http://</a:t>
+            </a:r>
+            <a:r>
+              <a:rPr lang="en-US" sz="1400" dirty="0" smtClean="0">
+                <a:solidFill>
+                  <a:schemeClr val="tx2">
+                    <a:lumMod val="75000"/>
+                    <a:lumOff val="25000"/>
+                  </a:schemeClr>
+                </a:solidFill>
+                <a:hlinkClick r:id="rId6"/>
+              </a:rPr>
+              <a:t>martinfowler.com/bliki/PageObject.html</a:t>
+            </a:r>
+            <a:endParaRPr lang="en-US" sz="1400" dirty="0" smtClean="0">
+              <a:solidFill>
+                <a:schemeClr val="tx2">
+                  <a:lumMod val="75000"/>
+                  <a:lumOff val="25000"/>
+                </a:schemeClr>
+              </a:solidFill>
+            </a:endParaRPr>
+          </a:p>
+          <a:p>
+            <a:r>
+              <a:rPr lang="en-US" sz="1400" dirty="0">
+                <a:solidFill>
+                  <a:schemeClr val="tx2">
+                    <a:lumMod val="75000"/>
+                    <a:lumOff val="25000"/>
+                  </a:schemeClr>
+                </a:solidFill>
+              </a:rPr>
+              <a:t>[5] - </a:t>
+            </a:r>
+            <a:r>
+              <a:rPr lang="en-US" sz="1400" dirty="0">
+                <a:solidFill>
+                  <a:schemeClr val="tx2">
+                    <a:lumMod val="75000"/>
+                    <a:lumOff val="25000"/>
+                  </a:schemeClr>
+                </a:solidFill>
+                <a:hlinkClick r:id="rId7"/>
+              </a:rPr>
+              <a:t>https://</a:t>
+            </a:r>
+            <a:r>
+              <a:rPr lang="en-US" sz="1400" dirty="0" smtClean="0">
+                <a:solidFill>
+                  <a:schemeClr val="tx2">
+                    <a:lumMod val="75000"/>
+                    <a:lumOff val="25000"/>
+                  </a:schemeClr>
+                </a:solidFill>
+                <a:hlinkClick r:id="rId7"/>
+              </a:rPr>
+              <a:t>www.visualstudio.com/en-us/products/visual-studio-community-vs.aspx</a:t>
+            </a:r>
+            <a:endParaRPr lang="en-US" sz="1400" dirty="0" smtClean="0">
+              <a:solidFill>
+                <a:schemeClr val="tx2">
+                  <a:lumMod val="75000"/>
+                  <a:lumOff val="25000"/>
+                </a:schemeClr>
+              </a:solidFill>
+            </a:endParaRPr>
+          </a:p>
+          <a:p>
+            <a:r>
+              <a:rPr lang="en-US" sz="1400" dirty="0">
+                <a:solidFill>
+                  <a:schemeClr val="tx2">
+                    <a:lumMod val="75000"/>
+                    <a:lumOff val="25000"/>
+                  </a:schemeClr>
+                </a:solidFill>
+              </a:rPr>
+              <a:t>[6] - </a:t>
+            </a:r>
+            <a:r>
+              <a:rPr lang="en-US" sz="1400" dirty="0">
+                <a:solidFill>
+                  <a:schemeClr val="tx2">
+                    <a:lumMod val="75000"/>
+                    <a:lumOff val="25000"/>
+                  </a:schemeClr>
+                </a:solidFill>
+                <a:hlinkClick r:id="rId8"/>
+              </a:rPr>
+              <a:t>http://www.specflow.org/documentation/Installation</a:t>
+            </a:r>
+            <a:r>
+              <a:rPr lang="en-US" sz="1400" dirty="0" smtClean="0">
+                <a:solidFill>
+                  <a:schemeClr val="tx2">
+                    <a:lumMod val="75000"/>
+                    <a:lumOff val="25000"/>
+                  </a:schemeClr>
+                </a:solidFill>
+                <a:hlinkClick r:id="rId8"/>
+              </a:rPr>
+              <a:t>/</a:t>
+            </a:r>
+            <a:endParaRPr lang="en-US" sz="1400" dirty="0" smtClean="0">
+              <a:solidFill>
+                <a:schemeClr val="tx2">
+                  <a:lumMod val="75000"/>
+                  <a:lumOff val="25000"/>
+                </a:schemeClr>
+              </a:solidFill>
+            </a:endParaRPr>
+          </a:p>
+          <a:p>
+            <a:r>
+              <a:rPr lang="en-US" sz="1400" dirty="0" smtClean="0">
+                <a:solidFill>
+                  <a:schemeClr val="tx2">
+                    <a:lumMod val="75000"/>
+                    <a:lumOff val="25000"/>
+                  </a:schemeClr>
+                </a:solidFill>
+              </a:rPr>
+              <a:t>[7] </a:t>
+            </a:r>
+            <a:r>
+              <a:rPr lang="en-US" sz="1400" dirty="0">
+                <a:solidFill>
+                  <a:schemeClr val="tx2">
+                    <a:lumMod val="75000"/>
+                    <a:lumOff val="25000"/>
+                  </a:schemeClr>
+                </a:solidFill>
+              </a:rPr>
+              <a:t>- </a:t>
+            </a:r>
+            <a:r>
+              <a:rPr lang="en-US" sz="1400" dirty="0">
+                <a:solidFill>
+                  <a:schemeClr val="tx2">
+                    <a:lumMod val="75000"/>
+                    <a:lumOff val="25000"/>
+                  </a:schemeClr>
+                </a:solidFill>
+                <a:hlinkClick r:id="rId9"/>
+              </a:rPr>
+              <a:t>https://github.com/cucumber/cucumber/wiki/Gherkin</a:t>
+            </a:r>
+            <a:endParaRPr lang="en-US" sz="1400" dirty="0" smtClean="0">
+              <a:solidFill>
+                <a:schemeClr val="tx2">
+                  <a:lumMod val="75000"/>
+                  <a:lumOff val="25000"/>
+                </a:schemeClr>
+              </a:solidFill>
+            </a:endParaRPr>
+          </a:p>
+          <a:p>
+            <a:r>
+              <a:rPr lang="en-US" sz="1400" dirty="0" smtClean="0">
+                <a:solidFill>
+                  <a:schemeClr val="tx2">
+                    <a:lumMod val="75000"/>
+                    <a:lumOff val="25000"/>
+                  </a:schemeClr>
+                </a:solidFill>
+              </a:rPr>
+              <a:t>[8] </a:t>
+            </a:r>
+            <a:r>
+              <a:rPr lang="en-US" sz="1400" dirty="0">
+                <a:solidFill>
+                  <a:schemeClr val="tx2">
+                    <a:lumMod val="75000"/>
+                    <a:lumOff val="25000"/>
+                  </a:schemeClr>
+                </a:solidFill>
+              </a:rPr>
+              <a:t>- </a:t>
+            </a:r>
+            <a:r>
+              <a:rPr lang="en-US" sz="1400" dirty="0">
+                <a:solidFill>
+                  <a:schemeClr val="tx2">
+                    <a:lumMod val="75000"/>
+                    <a:lumOff val="25000"/>
+                  </a:schemeClr>
+                </a:solidFill>
+                <a:hlinkClick r:id="rId10"/>
+              </a:rPr>
+              <a:t>https://</a:t>
+            </a:r>
+            <a:r>
+              <a:rPr lang="en-US" sz="1400" dirty="0" smtClean="0">
+                <a:solidFill>
+                  <a:schemeClr val="tx2">
+                    <a:lumMod val="75000"/>
+                    <a:lumOff val="25000"/>
+                  </a:schemeClr>
+                </a:solidFill>
+                <a:hlinkClick r:id="rId10"/>
+              </a:rPr>
+              <a:t>github.com/cucumber/cucumber/wiki/Given-When-Then</a:t>
+            </a:r>
+            <a:endParaRPr lang="en-US" sz="1400" dirty="0" smtClean="0">
+              <a:solidFill>
+                <a:schemeClr val="tx2">
+                  <a:lumMod val="75000"/>
+                  <a:lumOff val="25000"/>
+                </a:schemeClr>
+              </a:solidFill>
+            </a:endParaRPr>
+          </a:p>
+          <a:p>
+            <a:r>
+              <a:rPr lang="en-US" sz="1400" dirty="0">
+                <a:solidFill>
+                  <a:schemeClr val="tx2">
+                    <a:lumMod val="75000"/>
+                    <a:lumOff val="25000"/>
+                  </a:schemeClr>
+                </a:solidFill>
+              </a:rPr>
+              <a:t>[9] -</a:t>
+            </a:r>
+            <a:r>
+              <a:rPr lang="en-US" sz="1400" dirty="0">
+                <a:solidFill>
+                  <a:schemeClr val="tx2">
+                    <a:lumMod val="75000"/>
+                    <a:lumOff val="25000"/>
+                  </a:schemeClr>
+                </a:solidFill>
+                <a:hlinkClick r:id="rId11"/>
+              </a:rPr>
+              <a:t> http://www.marcusoft.net/2013/04/PushTheHowDown.html</a:t>
+            </a:r>
+            <a:endParaRPr lang="en-US" sz="1400" dirty="0" smtClean="0">
+              <a:solidFill>
+                <a:schemeClr val="tx2">
+                  <a:lumMod val="75000"/>
+                  <a:lumOff val="25000"/>
+                </a:schemeClr>
+              </a:solidFill>
+            </a:endParaRPr>
+          </a:p>
+          <a:p>
+            <a:endParaRPr lang="en-US" dirty="0" smtClean="0"/>
+          </a:p>
+          <a:p>
+            <a:endParaRPr lang="en-US" dirty="0"/>
+          </a:p>
+          <a:p>
+            <a:endParaRPr lang="en-US" dirty="0"/>
+          </a:p>
+        </p:txBody>
+      </p:sp>
+    </p:spTree>
+    <p:extLst>
+      <p:ext uri="{BB962C8B-B14F-4D97-AF65-F5344CB8AC3E}">
+        <p14:creationId xmlns:p14="http://schemas.microsoft.com/office/powerpoint/2010/main" val="2156864228"/>
+      </p:ext>
+    </p:extLst>
+  </p:cSld>
+  <p:clrMapOvr>
+    <a:masterClrMapping/>
+  </p:clrMapOvr>
+  <p:timing>
+    <p:tnLst>
+      <p:par>
+        <p:cTn id="1" dur="indefinite" restart="never" nodeType="tmRoot"/>
+      </p:par>
+    </p:tnLst>
+  </p:timing>
+</p:sld>
+</file>
+
+<file path=ppt/slides/slide13.xml><?xml version="1.0" encoding="utf-8"?>
+<p:sld xmlns:a="http://schemas.openxmlformats.org/drawingml/2006/main" xmlns:r="http://schemas.openxmlformats.org/officeDocument/2006/relationships" xmlns:p="http://schemas.openxmlformats.org/presentationml/2006/main">
+  <p:cSld>
+    <p:spTree>
+      <p:nvGrpSpPr>
+        <p:cNvPr id="1" name=""/>
+        <p:cNvGrpSpPr/>
+        <p:nvPr/>
+      </p:nvGrpSpPr>
+      <p:grpSpPr>
+        <a:xfrm>
+          <a:off x="0" y="0"/>
+          <a:ext cx="0" cy="0"/>
+          <a:chOff x="0" y="0"/>
+          <a:chExt cx="0" cy="0"/>
+        </a:xfrm>
+      </p:grpSpPr>
+      <p:sp>
+        <p:nvSpPr>
+          <p:cNvPr id="2" name="Title 1"/>
+          <p:cNvSpPr>
+            <a:spLocks noGrp="1"/>
+          </p:cNvSpPr>
+          <p:nvPr>
+            <p:ph type="title"/>
+          </p:nvPr>
+        </p:nvSpPr>
+        <p:spPr>
+          <a:xfrm>
+            <a:off x="624590" y="498392"/>
+            <a:ext cx="5932487" cy="4276032"/>
+          </a:xfrm>
+        </p:spPr>
+        <p:txBody>
+          <a:bodyPr/>
+          <a:lstStyle/>
+          <a:p>
+            <a:r>
               <a:rPr lang="en-US" dirty="0" smtClean="0"/>
               <a:t>THANK YOU</a:t>
             </a:r>
+            <a:br>
+              <a:rPr lang="en-US" dirty="0" smtClean="0"/>
+            </a:br>
+            <a:r>
+              <a:rPr lang="en-US" dirty="0"/>
+              <a:t/>
+            </a:r>
+            <a:br>
+              <a:rPr lang="en-US" dirty="0"/>
+            </a:br>
+            <a:r>
+              <a:rPr lang="en-US" dirty="0"/>
+              <a:t>Tommy Hinrichs</a:t>
+            </a:r>
+            <a:br>
+              <a:rPr lang="en-US" dirty="0"/>
+            </a:br>
+            <a:r>
+              <a:rPr lang="en-US" dirty="0"/>
+              <a:t>3/21/2015</a:t>
+            </a:r>
+            <a:r>
+              <a:rPr lang="en-US" dirty="0">
+                <a:solidFill>
+                  <a:schemeClr val="tx2">
+                    <a:lumMod val="75000"/>
+                    <a:lumOff val="25000"/>
+                  </a:schemeClr>
+                </a:solidFill>
+              </a:rPr>
+              <a:t/>
+            </a:r>
+            <a:br>
+              <a:rPr lang="en-US" dirty="0">
+                <a:solidFill>
+                  <a:schemeClr val="tx2">
+                    <a:lumMod val="75000"/>
+                    <a:lumOff val="25000"/>
+                  </a:schemeClr>
+                </a:solidFill>
+              </a:rPr>
+            </a:br>
+            <a:r>
+              <a:rPr lang="en-US" dirty="0" smtClean="0"/>
+              <a:t/>
+            </a:r>
+            <a:br>
+              <a:rPr lang="en-US" dirty="0" smtClean="0"/>
+            </a:br>
             <a:endParaRPr lang="en-US" dirty="0"/>
           </a:p>
         </p:txBody>
@@ -4722,18 +4848,7 @@
                   </a:schemeClr>
                 </a:solidFill>
               </a:rPr>
-              <a:t>The </a:t>
-            </a:r>
-            <a:r>
-              <a:rPr lang="en-US" dirty="0" smtClean="0">
-                <a:solidFill>
-                  <a:schemeClr val="tx2">
-                    <a:lumMod val="75000"/>
-                    <a:lumOff val="25000"/>
-                  </a:schemeClr>
-                </a:solidFill>
-              </a:rPr>
-              <a:t>Terms (</a:t>
+              <a:t>The Terms (</a:t>
             </a:r>
             <a:r>
               <a:rPr lang="en-US" sz="1400" dirty="0">
@@ -4747,7 +4862,7 @@
               <a:t>Some </a:t>
             </a:r>
             <a:r>
-              <a:rPr lang="en-US" sz="1500" dirty="0">
+              <a:rPr lang="en-US" sz="1400" dirty="0">
                 <a:solidFill>
                   <a:schemeClr val="tx2">
                     <a:lumMod val="75000"/>
@@ -4881,14 +4996,6 @@
               </a:rPr>
               <a:t>methodology” – Dan North</a:t>
             </a:r>
-            <a:endParaRPr lang="en-US" dirty="0" smtClean="0">
-              <a:solidFill>
-                <a:schemeClr val="tx2">
-                  <a:lumMod val="75000"/>
-                  <a:lumOff val="25000"/>
-                </a:schemeClr>
-              </a:solidFill>
-            </a:endParaRPr>
           </a:p>
           <a:p>
             <a:r>
@@ -5109,18 +5216,7 @@
                   </a:schemeClr>
                 </a:solidFill>
               </a:rPr>
-              <a:t>The </a:t>
-            </a:r>
-            <a:r>
-              <a:rPr lang="en-US" dirty="0" smtClean="0">
-                <a:solidFill>
-                  <a:schemeClr val="tx2">
-                    <a:lumMod val="75000"/>
-                    <a:lumOff val="25000"/>
-                  </a:schemeClr>
-                </a:solidFill>
-              </a:rPr>
-              <a:t>Terms (</a:t>
+              <a:t>The Terms (</a:t>
             </a:r>
             <a:r>
               <a:rPr lang="en-US" sz="1400" dirty="0" smtClean="0">
@@ -5286,14 +5382,6 @@
               </a:rPr>
               <a:t>Bridge from business’ ubiquitous language to your systems’ behavior</a:t>
             </a:r>
-            <a:endParaRPr lang="en-US" dirty="0" smtClean="0">
-              <a:solidFill>
-                <a:schemeClr val="tx2">
-                  <a:lumMod val="75000"/>
-                  <a:lumOff val="25000"/>
-                </a:schemeClr>
-              </a:solidFill>
-            </a:endParaRPr>
           </a:p>
           <a:p>
             <a:r>
@@ -5404,35 +5492,17 @@
             <p:ph type="title"/>
           </p:nvPr>
         </p:nvSpPr>
-        <p:spPr/>
+        <p:spPr>
+          <a:xfrm>
+            <a:off x="685800" y="219711"/>
+            <a:ext cx="4193327" cy="914400"/>
+          </a:xfrm>
+        </p:spPr>
         <p:txBody>
           <a:bodyPr/>
           <a:lstStyle/>
           <a:p>
             <a:r>
-              <a:rPr lang="en-US" dirty="0" smtClean="0"/>
-              <a:t>The Tools</a:t>
-            </a:r>
-            <a:endParaRPr lang="en-US" dirty="0"/>
-          </a:p>
-        </p:txBody>
-      </p:sp>
-      <p:sp>
-        <p:nvSpPr>
-          <p:cNvPr id="3" name="Content Placeholder 2"/>
-          <p:cNvSpPr>
-            <a:spLocks noGrp="1"/>
-          </p:cNvSpPr>
-          <p:nvPr>
-            <p:ph idx="1"/>
-          </p:nvPr>
-        </p:nvSpPr>
-        <p:spPr/>
-        <p:txBody>
-          <a:bodyPr/>
-          <a:lstStyle/>
-          <a:p>
-            <a:r>
               <a:rPr lang="en-US" dirty="0" smtClean="0">
                 <a:solidFill>
                   <a:schemeClr val="tx2">
@@ -5441,19 +5511,7 @@
                   </a:schemeClr>
                 </a:solidFill>
               </a:rPr>
-              <a:t>VS 2013 </a:t>
-            </a:r>
-            <a:r>
-              <a:rPr lang="en-US" sz="1400" dirty="0" smtClean="0">
-                <a:solidFill>
-                  <a:schemeClr val="tx2">
-                    <a:lumMod val="75000"/>
-                    <a:lumOff val="25000"/>
-                  </a:schemeClr>
-                </a:solidFill>
-                <a:hlinkClick r:id="rId2"/>
-              </a:rPr>
-              <a:t>[5]</a:t>
+              <a:t>The Process</a:t>
             </a:r>
             <a:endParaRPr lang="en-US" dirty="0">
               <a:solidFill>
@@ -5464,6 +5522,298 @@
               </a:solidFill>
             </a:endParaRPr>
           </a:p>
+        </p:txBody>
+      </p:sp>
+      <p:pic>
+        <p:nvPicPr>
+          <p:cNvPr id="4" name="Content Placeholder 3"/>
+          <p:cNvPicPr>
+            <a:picLocks noGrp="1" noChangeAspect="1"/>
+          </p:cNvPicPr>
+          <p:nvPr>
+            <p:ph idx="1"/>
+          </p:nvPr>
+        </p:nvPicPr>
+        <p:blipFill>
+          <a:blip r:embed="rId2"/>
+          <a:stretch>
+            <a:fillRect/>
+          </a:stretch>
+        </p:blipFill>
+        <p:spPr>
+          <a:xfrm>
+            <a:off x="4462062" y="0"/>
+            <a:ext cx="4258828" cy="5486400"/>
+          </a:xfrm>
+          <a:prstGeom prst="rect">
+            <a:avLst/>
+          </a:prstGeom>
+        </p:spPr>
+      </p:pic>
+      <p:sp>
+        <p:nvSpPr>
+          <p:cNvPr id="5" name="Content Placeholder 2"/>
+          <p:cNvSpPr txBox="1">
+            <a:spLocks/>
+          </p:cNvSpPr>
+          <p:nvPr/>
+        </p:nvSpPr>
+        <p:spPr>
+          <a:xfrm>
+            <a:off x="0" y="1280161"/>
+            <a:ext cx="4462062" cy="2987040"/>
+          </a:xfrm>
+          <a:prstGeom prst="rect">
+            <a:avLst/>
+          </a:prstGeom>
+        </p:spPr>
+        <p:txBody>
+          <a:bodyPr vert="horz" lIns="0" tIns="45720" rIns="0" bIns="45720" rtlCol="0">
+            <a:normAutofit/>
+          </a:bodyPr>
+          <a:lstStyle>
+            <a:lvl1pPr marL="342900" indent="-274320" algn="l" defTabSz="914400" rtl="0" eaLnBrk="1" latinLnBrk="0" hangingPunct="1">
+              <a:lnSpc>
+                <a:spcPct val="100000"/>
+              </a:lnSpc>
+              <a:spcBef>
+                <a:spcPts val="700"/>
+              </a:spcBef>
+              <a:buClr>
+                <a:schemeClr val="accent2">
+                  <a:lumMod val="60000"/>
+                  <a:lumOff val="40000"/>
+                </a:schemeClr>
+              </a:buClr>
+              <a:buSzPct val="85000"/>
+              <a:buFont typeface="Lucida Grande"/>
+              <a:buChar char="❮"/>
+              <a:defRPr sz="2000" b="0" i="0" kern="1200" baseline="0">
+                <a:solidFill>
+                  <a:schemeClr val="tx2">
+                    <a:lumMod val="50000"/>
+                    <a:lumOff val="50000"/>
+                  </a:schemeClr>
+                </a:solidFill>
+                <a:latin typeface="Helvetica Neue"/>
+                <a:ea typeface="+mn-ea"/>
+                <a:cs typeface="Helvetica Neue"/>
+              </a:defRPr>
+            </a:lvl1pPr>
+            <a:lvl2pPr marL="742950" indent="-274320" algn="l" defTabSz="914400" rtl="0" eaLnBrk="1" latinLnBrk="0" hangingPunct="1">
+              <a:lnSpc>
+                <a:spcPct val="100000"/>
+              </a:lnSpc>
+              <a:spcBef>
+                <a:spcPts val="700"/>
+              </a:spcBef>
+              <a:buClr>
+                <a:schemeClr val="accent2">
+                  <a:lumMod val="60000"/>
+                  <a:lumOff val="40000"/>
+                </a:schemeClr>
+              </a:buClr>
+              <a:buSzPct val="85000"/>
+              <a:buFont typeface="Lucida Grande"/>
+              <a:buChar char="❮"/>
+              <a:defRPr sz="1600" kern="1200" baseline="0">
+                <a:solidFill>
+                  <a:schemeClr val="tx2">
+                    <a:lumMod val="50000"/>
+                    <a:lumOff val="50000"/>
+                  </a:schemeClr>
+                </a:solidFill>
+                <a:latin typeface="HelveticaNeueLT Std Lt"/>
+                <a:ea typeface="+mn-ea"/>
+                <a:cs typeface="HelveticaNeueLT Std Lt"/>
+              </a:defRPr>
+            </a:lvl2pPr>
+            <a:lvl3pPr marL="1143000" indent="-274320" algn="l" defTabSz="914400" rtl="0" eaLnBrk="1" latinLnBrk="0" hangingPunct="1">
+              <a:lnSpc>
+                <a:spcPct val="100000"/>
+              </a:lnSpc>
+              <a:spcBef>
+                <a:spcPts val="700"/>
+              </a:spcBef>
+              <a:buClr>
+                <a:schemeClr val="accent2">
+                  <a:lumMod val="60000"/>
+                  <a:lumOff val="40000"/>
+                </a:schemeClr>
+              </a:buClr>
+              <a:buSzPct val="85000"/>
+              <a:buFont typeface="Lucida Grande"/>
+              <a:buChar char="❮"/>
+              <a:defRPr sz="1400" kern="1200" baseline="0">
+                <a:solidFill>
+                  <a:schemeClr val="tx2">
+                    <a:lumMod val="50000"/>
+                    <a:lumOff val="50000"/>
+                  </a:schemeClr>
+                </a:solidFill>
+                <a:latin typeface="HelveticaNeueLT Std Med"/>
+                <a:ea typeface="+mn-ea"/>
+                <a:cs typeface="HelveticaNeueLT Std Med"/>
+              </a:defRPr>
+            </a:lvl3pPr>
+            <a:lvl4pPr marL="1600200" indent="-274320" algn="l" defTabSz="914400" rtl="0" eaLnBrk="1" latinLnBrk="0" hangingPunct="1">
+              <a:lnSpc>
+                <a:spcPct val="100000"/>
+              </a:lnSpc>
+              <a:spcBef>
+                <a:spcPts val="700"/>
+              </a:spcBef>
+              <a:buClr>
+                <a:schemeClr val="accent2">
+                  <a:lumMod val="60000"/>
+                  <a:lumOff val="40000"/>
+                </a:schemeClr>
+              </a:buClr>
+              <a:buSzPct val="85000"/>
+              <a:buFont typeface="Lucida Grande"/>
+              <a:buChar char="❮"/>
+              <a:defRPr sz="1400" kern="1200" baseline="0">
+                <a:solidFill>
+                  <a:schemeClr val="tx2">
+                    <a:lumMod val="50000"/>
+                    <a:lumOff val="50000"/>
+                  </a:schemeClr>
+                </a:solidFill>
+                <a:latin typeface="HelveticaNeueLT Std Lt"/>
+                <a:ea typeface="+mn-ea"/>
+                <a:cs typeface="HelveticaNeueLT Std Lt"/>
+              </a:defRPr>
+            </a:lvl4pPr>
+            <a:lvl5pPr marL="2057400" indent="-274320" algn="l" defTabSz="914400" rtl="0" eaLnBrk="1" latinLnBrk="0" hangingPunct="1">
+              <a:lnSpc>
+                <a:spcPct val="100000"/>
+              </a:lnSpc>
+              <a:spcBef>
+                <a:spcPts val="700"/>
+              </a:spcBef>
+              <a:buClr>
+                <a:schemeClr val="accent2">
+                  <a:lumMod val="60000"/>
+                  <a:lumOff val="40000"/>
+                </a:schemeClr>
+              </a:buClr>
+              <a:buSzPct val="85000"/>
+              <a:buFont typeface="Lucida Grande"/>
+              <a:buChar char="❮"/>
+              <a:defRPr sz="1400" kern="1200" baseline="0">
+                <a:solidFill>
+                  <a:schemeClr val="tx2">
+                    <a:lumMod val="50000"/>
+                    <a:lumOff val="50000"/>
+                  </a:schemeClr>
+                </a:solidFill>
+                <a:latin typeface="HelveticaNeueLT Std Lt"/>
+                <a:ea typeface="+mn-ea"/>
+                <a:cs typeface="HelveticaNeueLT Std Lt"/>
+              </a:defRPr>
+            </a:lvl5pPr>
+            <a:lvl6pPr marL="2514600" indent="-274320" algn="l" defTabSz="914400" rtl="0" eaLnBrk="1" latinLnBrk="0" hangingPunct="1">
+              <a:lnSpc>
+                <a:spcPct val="100000"/>
+              </a:lnSpc>
+              <a:spcBef>
+                <a:spcPts val="700"/>
+              </a:spcBef>
+              <a:buClr>
+                <a:schemeClr val="accent1"/>
+              </a:buClr>
+              <a:buSzPct val="85000"/>
+              <a:buFont typeface="Wingdings 3" pitchFamily="18" charset="2"/>
+              <a:buChar char=""/>
+              <a:defRPr sz="1400" kern="1200">
+                <a:solidFill>
+                  <a:schemeClr val="tx1"/>
+                </a:solidFill>
+                <a:latin typeface="+mn-lt"/>
+                <a:ea typeface="+mn-ea"/>
+                <a:cs typeface="+mn-cs"/>
+              </a:defRPr>
+            </a:lvl6pPr>
+            <a:lvl7pPr marL="2971800" indent="-274320" algn="l" defTabSz="914400" rtl="0" eaLnBrk="1" latinLnBrk="0" hangingPunct="1">
+              <a:lnSpc>
+                <a:spcPct val="100000"/>
+              </a:lnSpc>
+              <a:spcBef>
+                <a:spcPts val="700"/>
+              </a:spcBef>
+              <a:buClr>
+                <a:schemeClr val="accent1"/>
+              </a:buClr>
+              <a:buSzPct val="85000"/>
+              <a:buFont typeface="Wingdings 3" pitchFamily="18" charset="2"/>
+              <a:buChar char=""/>
+              <a:defRPr sz="1400" kern="1200">
+                <a:solidFill>
+                  <a:schemeClr val="tx1"/>
+                </a:solidFill>
+                <a:latin typeface="+mn-lt"/>
+                <a:ea typeface="+mn-ea"/>
+                <a:cs typeface="+mn-cs"/>
+              </a:defRPr>
+            </a:lvl7pPr>
+            <a:lvl8pPr marL="3429000" indent="-274320" algn="l" defTabSz="914400" rtl="0" eaLnBrk="1" latinLnBrk="0" hangingPunct="1">
+              <a:lnSpc>
+                <a:spcPct val="100000"/>
+              </a:lnSpc>
+              <a:spcBef>
+                <a:spcPts val="700"/>
+              </a:spcBef>
+              <a:buClr>
+                <a:schemeClr val="accent1"/>
+              </a:buClr>
+              <a:buSzPct val="85000"/>
+              <a:buFont typeface="Wingdings 3" pitchFamily="18" charset="2"/>
+              <a:buChar char=""/>
+              <a:defRPr sz="1400" kern="1200">
+                <a:solidFill>
+                  <a:schemeClr val="tx1"/>
+                </a:solidFill>
+                <a:latin typeface="+mn-lt"/>
+                <a:ea typeface="+mn-ea"/>
+                <a:cs typeface="+mn-cs"/>
+              </a:defRPr>
+            </a:lvl8pPr>
+            <a:lvl9pPr marL="3886200" indent="-274320" algn="l" defTabSz="914400" rtl="0" eaLnBrk="1" latinLnBrk="0" hangingPunct="1">
+              <a:lnSpc>
+                <a:spcPct val="100000"/>
+              </a:lnSpc>
+              <a:spcBef>
+                <a:spcPts val="700"/>
+              </a:spcBef>
+              <a:buClr>
+                <a:schemeClr val="accent1"/>
+              </a:buClr>
+              <a:buSzPct val="85000"/>
+              <a:buFont typeface="Wingdings 3" pitchFamily="18" charset="2"/>
+              <a:buChar char=""/>
+              <a:defRPr sz="1400" kern="1200">
+                <a:solidFill>
+                  <a:schemeClr val="tx1"/>
+                </a:solidFill>
+                <a:latin typeface="+mn-lt"/>
+                <a:ea typeface="+mn-ea"/>
+                <a:cs typeface="+mn-cs"/>
+              </a:defRPr>
+            </a:lvl9pPr>
+          </a:lstStyle>
+          <a:p>
+            <a:r>
+              <a:rPr lang="en-US" dirty="0" smtClean="0">
+                <a:solidFill>
+                  <a:schemeClr val="tx2">
+                    <a:lumMod val="75000"/>
+                    <a:lumOff val="25000"/>
+                  </a:schemeClr>
+                </a:solidFill>
+              </a:rPr>
+              <a:t>Key</a:t>
+            </a:r>
+          </a:p>
           <a:p>
             <a:pPr lvl="1"/>
             <a:r>
@@ -5475,34 +5825,11 @@
                   </a:schemeClr>
                 </a:solidFill>
               </a:rPr>
-              <a:t>Demoing with Visual Studio Ultimate, link is for Visual Studio Community</a:t>
-            </a:r>
-          </a:p>
-          <a:p>
-            <a:pPr marL="468630" lvl="1" indent="0">
-              <a:buNone/>
-            </a:pPr>
-            <a:endParaRPr lang="en-US" dirty="0" smtClean="0">
-              <a:solidFill>
-                <a:schemeClr val="tx2">
-                  <a:lumMod val="75000"/>
-                  <a:lumOff val="25000"/>
-                </a:schemeClr>
-              </a:solidFill>
-            </a:endParaRPr>
-          </a:p>
-          <a:p>
-            <a:r>
-              <a:rPr lang="en-US" dirty="0" err="1" smtClean="0">
-                <a:solidFill>
-                  <a:schemeClr val="tx2">
-                    <a:lumMod val="75000"/>
-                    <a:lumOff val="25000"/>
-                  </a:schemeClr>
-                </a:solidFill>
-              </a:rPr>
-              <a:t>SpecFlow</a:t>
-            </a:r>
+              <a:t>Figures – Roles, Not Individuals</a:t>
+            </a:r>
+          </a:p>
+          <a:p>
+            <a:pPr lvl="1"/>
             <a:r>
               <a:rPr lang="en-US" dirty="0" smtClean="0">
                 <a:solidFill>
@@ -5512,20 +5839,11 @@
                   </a:schemeClr>
                 </a:solidFill>
               </a:rPr>
-              <a:t> </a:t>
-            </a:r>
-            <a:r>
-              <a:rPr lang="en-US" sz="1400" dirty="0" smtClean="0">
-                <a:solidFill>
-                  <a:schemeClr val="tx2">
-                    <a:lumMod val="75000"/>
-                    <a:lumOff val="25000"/>
-                  </a:schemeClr>
-                </a:solidFill>
-                <a:hlinkClick r:id="rId3"/>
-              </a:rPr>
-              <a:t>[6]</a:t>
-            </a:r>
+              <a:t>Right Arrows – Role’s Actions</a:t>
+            </a:r>
+          </a:p>
+          <a:p>
+            <a:pPr lvl="1"/>
             <a:r>
               <a:rPr lang="en-US" dirty="0" smtClean="0">
                 <a:solidFill>
@@ -5535,94 +5853,37 @@
                   </a:schemeClr>
                 </a:solidFill>
               </a:rPr>
-              <a:t> </a:t>
+              <a:t>Down arrows – Layer Relation</a:t>
+            </a:r>
+          </a:p>
+          <a:p>
+            <a:r>
+              <a:rPr lang="en-US" dirty="0" smtClean="0">
+                <a:solidFill>
+                  <a:schemeClr val="tx2">
+                    <a:lumMod val="75000"/>
+                    <a:lumOff val="25000"/>
+                  </a:schemeClr>
+                </a:solidFill>
+              </a:rPr>
+              <a:t>Layer 1 – During Feature Definition</a:t>
+            </a:r>
+          </a:p>
+          <a:p>
+            <a:r>
+              <a:rPr lang="en-US" dirty="0" smtClean="0">
+                <a:solidFill>
+                  <a:schemeClr val="tx2">
+                    <a:lumMod val="75000"/>
+                    <a:lumOff val="25000"/>
+                  </a:schemeClr>
+                </a:solidFill>
+              </a:rPr>
+              <a:t>Layer 2 to 5 – Parallel through sprint </a:t>
             </a:r>
           </a:p>
           <a:p>
             <a:pPr lvl="1"/>
-            <a:r>
-              <a:rPr lang="en-US" dirty="0" smtClean="0">
-                <a:solidFill>
-                  <a:schemeClr val="tx2">
-                    <a:lumMod val="75000"/>
-                    <a:lumOff val="25000"/>
-                  </a:schemeClr>
-                </a:solidFill>
-              </a:rPr>
-              <a:t>Visual Studio add in, </a:t>
-            </a:r>
-            <a:r>
-              <a:rPr lang="en-US" dirty="0" err="1" smtClean="0">
-                <a:solidFill>
-                  <a:schemeClr val="tx2">
-                    <a:lumMod val="75000"/>
-                    <a:lumOff val="25000"/>
-                  </a:schemeClr>
-                </a:solidFill>
-              </a:rPr>
-              <a:t>Nuget</a:t>
-            </a:r>
-            <a:r>
-              <a:rPr lang="en-US" dirty="0" smtClean="0">
-                <a:solidFill>
-                  <a:schemeClr val="tx2">
-                    <a:lumMod val="75000"/>
-                    <a:lumOff val="25000"/>
-                  </a:schemeClr>
-                </a:solidFill>
-              </a:rPr>
-              <a:t> Package, </a:t>
-            </a:r>
-            <a:r>
-              <a:rPr lang="en-US" dirty="0" err="1" smtClean="0">
-                <a:solidFill>
-                  <a:schemeClr val="tx2">
-                    <a:lumMod val="75000"/>
-                    <a:lumOff val="25000"/>
-                  </a:schemeClr>
-                </a:solidFill>
-              </a:rPr>
-              <a:t>MSBuild</a:t>
-            </a:r>
-            <a:r>
-              <a:rPr lang="en-US" dirty="0" smtClean="0">
-                <a:solidFill>
-                  <a:schemeClr val="tx2">
-                    <a:lumMod val="75000"/>
-                    <a:lumOff val="25000"/>
-                  </a:schemeClr>
-                </a:solidFill>
-              </a:rPr>
-              <a:t> tasks</a:t>
-            </a:r>
-          </a:p>
-          <a:p>
-            <a:pPr marL="468630" lvl="1" indent="0">
-              <a:buNone/>
-            </a:pPr>
-            <a:endParaRPr lang="en-US" dirty="0" smtClean="0">
-              <a:solidFill>
-                <a:schemeClr val="tx2">
-                  <a:lumMod val="75000"/>
-                  <a:lumOff val="25000"/>
-                </a:schemeClr>
-              </a:solidFill>
-            </a:endParaRPr>
-          </a:p>
-          <a:p>
-            <a:r>
-              <a:rPr lang="en-US" dirty="0" smtClean="0">
-                <a:solidFill>
-                  <a:schemeClr val="tx2">
-                    <a:lumMod val="75000"/>
-                    <a:lumOff val="25000"/>
-                  </a:schemeClr>
-                </a:solidFill>
-              </a:rPr>
-              <a:t>DOS Batch</a:t>
-            </a:r>
-          </a:p>
-          <a:p>
             <a:endParaRPr lang="en-US" dirty="0">
               <a:solidFill>
                 <a:schemeClr val="tx2">
@@ -5637,7 +5898,7 @@
     </p:spTree>
     <p:extLst>
       <p:ext uri="{BB962C8B-B14F-4D97-AF65-F5344CB8AC3E}">
-        <p14:creationId xmlns:p14="http://schemas.microsoft.com/office/powerpoint/2010/main" val="946563298"/>
+        <p14:creationId xmlns:p14="http://schemas.microsoft.com/office/powerpoint/2010/main" val="1589647433"/>
       </p:ext>
     </p:extLst>
   </p:cSld>
@@ -5681,7 +5942,7 @@
           <a:p>
             <a:r>
               <a:rPr lang="en-US" dirty="0" smtClean="0"/>
-              <a:t>SPECFLOW Installation</a:t>
+              <a:t>The Tools</a:t>
             </a:r>
             <a:endParaRPr lang="en-US" dirty="0"/>
           </a:p>
@@ -5703,43 +5964,277 @@
           <a:lstStyle/>
           <a:p>
             <a:r>
-              <a:rPr lang="en-US" dirty="0" smtClean="0"/>
-              <a:t>VSIX</a:t>
-            </a:r>
-          </a:p>
-          <a:p>
-            <a:endParaRPr lang="en-US" dirty="0"/>
+              <a:rPr lang="en-US" dirty="0" smtClean="0">
+                <a:solidFill>
+                  <a:schemeClr val="tx2">
+                    <a:lumMod val="75000"/>
+                    <a:lumOff val="25000"/>
+                  </a:schemeClr>
+                </a:solidFill>
+              </a:rPr>
+              <a:t>VS 2013 </a:t>
+            </a:r>
+            <a:r>
+              <a:rPr lang="en-US" sz="1400" dirty="0" smtClean="0">
+                <a:solidFill>
+                  <a:schemeClr val="tx2">
+                    <a:lumMod val="75000"/>
+                    <a:lumOff val="25000"/>
+                  </a:schemeClr>
+                </a:solidFill>
+                <a:hlinkClick r:id="rId2"/>
+              </a:rPr>
+              <a:t>[5]</a:t>
+            </a:r>
+            <a:endParaRPr lang="en-US" dirty="0">
+              <a:solidFill>
+                <a:schemeClr val="tx2">
+                  <a:lumMod val="75000"/>
+                  <a:lumOff val="25000"/>
+                </a:schemeClr>
+              </a:solidFill>
+            </a:endParaRPr>
+          </a:p>
+          <a:p>
+            <a:pPr lvl="1"/>
+            <a:r>
+              <a:rPr lang="en-US" dirty="0" smtClean="0">
+                <a:solidFill>
+                  <a:schemeClr val="tx2">
+                    <a:lumMod val="75000"/>
+                    <a:lumOff val="25000"/>
+                  </a:schemeClr>
+                </a:solidFill>
+              </a:rPr>
+              <a:t>I’m Demoing </a:t>
+            </a:r>
+            <a:r>
+              <a:rPr lang="en-US" dirty="0" smtClean="0">
+                <a:solidFill>
+                  <a:schemeClr val="tx2">
+                    <a:lumMod val="75000"/>
+                    <a:lumOff val="25000"/>
+                  </a:schemeClr>
+                </a:solidFill>
+              </a:rPr>
+              <a:t>with Visual Studio </a:t>
+            </a:r>
+            <a:r>
+              <a:rPr lang="en-US" dirty="0" smtClean="0">
+                <a:solidFill>
+                  <a:schemeClr val="tx2">
+                    <a:lumMod val="75000"/>
+                    <a:lumOff val="25000"/>
+                  </a:schemeClr>
+                </a:solidFill>
+              </a:rPr>
+              <a:t>Ultimate</a:t>
+            </a:r>
+          </a:p>
+          <a:p>
+            <a:pPr lvl="1"/>
+            <a:r>
+              <a:rPr lang="en-US" dirty="0" smtClean="0">
+                <a:solidFill>
+                  <a:schemeClr val="tx2">
+                    <a:lumMod val="75000"/>
+                    <a:lumOff val="25000"/>
+                  </a:schemeClr>
+                </a:solidFill>
+              </a:rPr>
+              <a:t>Link </a:t>
+            </a:r>
+            <a:r>
+              <a:rPr lang="en-US" dirty="0" smtClean="0">
+                <a:solidFill>
+                  <a:schemeClr val="tx2">
+                    <a:lumMod val="75000"/>
+                    <a:lumOff val="25000"/>
+                  </a:schemeClr>
+                </a:solidFill>
+              </a:rPr>
+              <a:t>is for Visual Studio Community</a:t>
+            </a:r>
+          </a:p>
+          <a:p>
+            <a:pPr marL="468630" lvl="1" indent="0">
+              <a:buNone/>
+            </a:pPr>
+            <a:endParaRPr lang="en-US" dirty="0" smtClean="0">
+              <a:solidFill>
+                <a:schemeClr val="tx2">
+                  <a:lumMod val="75000"/>
+                  <a:lumOff val="25000"/>
+                </a:schemeClr>
+              </a:solidFill>
+            </a:endParaRPr>
+          </a:p>
+          <a:p>
+            <a:r>
+              <a:rPr lang="en-US" dirty="0" err="1" smtClean="0">
+                <a:solidFill>
+                  <a:schemeClr val="tx2">
+                    <a:lumMod val="75000"/>
+                    <a:lumOff val="25000"/>
+                  </a:schemeClr>
+                </a:solidFill>
+              </a:rPr>
+              <a:t>SpecFlow</a:t>
+            </a:r>
+            <a:r>
+              <a:rPr lang="en-US" dirty="0" smtClean="0">
+                <a:solidFill>
+                  <a:schemeClr val="tx2">
+                    <a:lumMod val="75000"/>
+                    <a:lumOff val="25000"/>
+                  </a:schemeClr>
+                </a:solidFill>
+              </a:rPr>
+              <a:t> </a:t>
+            </a:r>
+            <a:r>
+              <a:rPr lang="en-US" sz="1400" dirty="0" smtClean="0">
+                <a:solidFill>
+                  <a:schemeClr val="tx2">
+                    <a:lumMod val="75000"/>
+                    <a:lumOff val="25000"/>
+                  </a:schemeClr>
+                </a:solidFill>
+                <a:hlinkClick r:id="rId3"/>
+              </a:rPr>
+              <a:t>[6]</a:t>
+            </a:r>
+            <a:r>
+              <a:rPr lang="en-US" dirty="0" smtClean="0">
+                <a:solidFill>
+                  <a:schemeClr val="tx2">
+                    <a:lumMod val="75000"/>
+                    <a:lumOff val="25000"/>
+                  </a:schemeClr>
+                </a:solidFill>
+              </a:rPr>
+              <a:t> </a:t>
+            </a:r>
+          </a:p>
+          <a:p>
+            <a:pPr lvl="1"/>
+            <a:r>
+              <a:rPr lang="en-US" dirty="0" smtClean="0">
+                <a:solidFill>
+                  <a:schemeClr val="tx2">
+                    <a:lumMod val="75000"/>
+                    <a:lumOff val="25000"/>
+                  </a:schemeClr>
+                </a:solidFill>
+              </a:rPr>
+              <a:t>Visual Studio add in, </a:t>
+            </a:r>
+            <a:r>
+              <a:rPr lang="en-US" dirty="0" err="1" smtClean="0">
+                <a:solidFill>
+                  <a:schemeClr val="tx2">
+                    <a:lumMod val="75000"/>
+                    <a:lumOff val="25000"/>
+                  </a:schemeClr>
+                </a:solidFill>
+              </a:rPr>
+              <a:t>Nuget</a:t>
+            </a:r>
+            <a:r>
+              <a:rPr lang="en-US" dirty="0" smtClean="0">
+                <a:solidFill>
+                  <a:schemeClr val="tx2">
+                    <a:lumMod val="75000"/>
+                    <a:lumOff val="25000"/>
+                  </a:schemeClr>
+                </a:solidFill>
+              </a:rPr>
+              <a:t> Package, </a:t>
+            </a:r>
+            <a:r>
+              <a:rPr lang="en-US" dirty="0" err="1" smtClean="0">
+                <a:solidFill>
+                  <a:schemeClr val="tx2">
+                    <a:lumMod val="75000"/>
+                    <a:lumOff val="25000"/>
+                  </a:schemeClr>
+                </a:solidFill>
+              </a:rPr>
+              <a:t>MSBuild</a:t>
+            </a:r>
+            <a:r>
+              <a:rPr lang="en-US" dirty="0" smtClean="0">
+                <a:solidFill>
+                  <a:schemeClr val="tx2">
+                    <a:lumMod val="75000"/>
+                    <a:lumOff val="25000"/>
+                  </a:schemeClr>
+                </a:solidFill>
+              </a:rPr>
+              <a:t> tasks</a:t>
+            </a:r>
+          </a:p>
+          <a:p>
+            <a:pPr marL="468630" lvl="1" indent="0">
+              <a:buNone/>
+            </a:pPr>
+            <a:endParaRPr lang="en-US" dirty="0" smtClean="0">
+              <a:solidFill>
+                <a:schemeClr val="tx2">
+                  <a:lumMod val="75000"/>
+                  <a:lumOff val="25000"/>
+                </a:schemeClr>
+              </a:solidFill>
+            </a:endParaRPr>
+          </a:p>
+          <a:p>
+            <a:r>
+              <a:rPr lang="en-US" dirty="0" smtClean="0">
+                <a:solidFill>
+                  <a:schemeClr val="tx2">
+                    <a:lumMod val="75000"/>
+                    <a:lumOff val="25000"/>
+                  </a:schemeClr>
+                </a:solidFill>
+              </a:rPr>
+              <a:t>DOS </a:t>
+            </a:r>
+            <a:r>
+              <a:rPr lang="en-US" dirty="0" smtClean="0">
+                <a:solidFill>
+                  <a:schemeClr val="tx2">
+                    <a:lumMod val="75000"/>
+                    <a:lumOff val="25000"/>
+                  </a:schemeClr>
+                </a:solidFill>
+              </a:rPr>
+              <a:t>Batch (Probably should be PS)</a:t>
+            </a:r>
+            <a:endParaRPr lang="en-US" dirty="0" smtClean="0">
+              <a:solidFill>
+                <a:schemeClr val="tx2">
+                  <a:lumMod val="75000"/>
+                  <a:lumOff val="25000"/>
+                </a:schemeClr>
+              </a:solidFill>
+            </a:endParaRPr>
+          </a:p>
+          <a:p>
+            <a:endParaRPr lang="en-US" dirty="0">
+              <a:solidFill>
+                <a:schemeClr val="tx2">
+                  <a:lumMod val="75000"/>
+                  <a:lumOff val="25000"/>
+                </a:schemeClr>
+              </a:solidFill>
+            </a:endParaRPr>
           </a:p>
         </p:txBody>
       </p:sp>
-      <p:pic>
-        <p:nvPicPr>
-          <p:cNvPr id="4" name="Picture 3"/>
-          <p:cNvPicPr>
-            <a:picLocks noChangeAspect="1"/>
-          </p:cNvPicPr>
-          <p:nvPr/>
-        </p:nvPicPr>
-        <p:blipFill>
-          <a:blip r:embed="rId2"/>
-          <a:stretch>
-            <a:fillRect/>
-          </a:stretch>
-        </p:blipFill>
-        <p:spPr>
-          <a:xfrm>
-            <a:off x="685800" y="1788237"/>
-            <a:ext cx="5209194" cy="2625014"/>
-          </a:xfrm>
-          <a:prstGeom prst="rect">
-            <a:avLst/>
-          </a:prstGeom>
-        </p:spPr>
-      </p:pic>
     </p:spTree>
     <p:extLst>
       <p:ext uri="{BB962C8B-B14F-4D97-AF65-F5344CB8AC3E}">
-        <p14:creationId xmlns:p14="http://schemas.microsoft.com/office/powerpoint/2010/main" val="1304004053"/>
+        <p14:creationId xmlns:p14="http://schemas.microsoft.com/office/powerpoint/2010/main" val="946563298"/>
       </p:ext>
     </p:extLst>
   </p:cSld>
@@ -5806,16 +6301,7 @@
           <a:p>
             <a:r>
               <a:rPr lang="en-US" dirty="0" smtClean="0"/>
-              <a:t>Decide which test runner to use</a:t>
-            </a:r>
-          </a:p>
-          <a:p>
-            <a:endParaRPr lang="en-US" dirty="0"/>
-          </a:p>
-          <a:p>
-            <a:r>
-              <a:rPr lang="en-US" dirty="0" smtClean="0"/>
-              <a:t>NUGET PACKAGE</a:t>
+              <a:t>VSIX</a:t>
             </a:r>
           </a:p>
           <a:p>
@@ -5825,7 +6311,7 @@
       </p:sp>
       <p:pic>
         <p:nvPicPr>
-          <p:cNvPr id="5" name="Picture 4"/>
+          <p:cNvPr id="4" name="Picture 3"/>
           <p:cNvPicPr>
             <a:picLocks noChangeAspect="1"/>
           </p:cNvPicPr>
@@ -5839,8 +6325,8 @@
         </p:blipFill>
         <p:spPr>
           <a:xfrm>
-            <a:off x="685800" y="2514469"/>
-            <a:ext cx="4257675" cy="895350"/>
+            <a:off x="685800" y="1788237"/>
+            <a:ext cx="5209194" cy="2625014"/>
           </a:xfrm>
           <a:prstGeom prst="rect">
             <a:avLst/>
@@ -5850,7 +6336,7 @@
     </p:spTree>
     <p:extLst>
       <p:ext uri="{BB962C8B-B14F-4D97-AF65-F5344CB8AC3E}">
-        <p14:creationId xmlns:p14="http://schemas.microsoft.com/office/powerpoint/2010/main" val="1667495316"/>
+        <p14:creationId xmlns:p14="http://schemas.microsoft.com/office/powerpoint/2010/main" val="1304004053"/>
       </p:ext>
     </p:extLst>
   </p:cSld>
@@ -5894,6 +6380,117 @@
           <a:p>
             <a:r>
               <a:rPr lang="en-US" dirty="0" smtClean="0"/>
+              <a:t>SPECFLOW Installation</a:t>
+            </a:r>
+            <a:endParaRPr lang="en-US" dirty="0"/>
+          </a:p>
+        </p:txBody>
+      </p:sp>
+      <p:sp>
+        <p:nvSpPr>
+          <p:cNvPr id="3" name="Content Placeholder 2"/>
+          <p:cNvSpPr>
+            <a:spLocks noGrp="1"/>
+          </p:cNvSpPr>
+          <p:nvPr>
+            <p:ph idx="1"/>
+          </p:nvPr>
+        </p:nvSpPr>
+        <p:spPr/>
+        <p:txBody>
+          <a:bodyPr/>
+          <a:lstStyle/>
+          <a:p>
+            <a:r>
+              <a:rPr lang="en-US" dirty="0" smtClean="0"/>
+              <a:t>Decide which test runner to use</a:t>
+            </a:r>
+          </a:p>
+          <a:p>
+            <a:endParaRPr lang="en-US" dirty="0"/>
+          </a:p>
+          <a:p>
+            <a:r>
+              <a:rPr lang="en-US" dirty="0" smtClean="0"/>
+              <a:t>NUGET PACKAGE</a:t>
+            </a:r>
+          </a:p>
+          <a:p>
+            <a:endParaRPr lang="en-US" dirty="0"/>
+          </a:p>
+        </p:txBody>
+      </p:sp>
+      <p:pic>
+        <p:nvPicPr>
+          <p:cNvPr id="5" name="Picture 4"/>
+          <p:cNvPicPr>
+            <a:picLocks noChangeAspect="1"/>
+          </p:cNvPicPr>
+          <p:nvPr/>
+        </p:nvPicPr>
+        <p:blipFill>
+          <a:blip r:embed="rId2"/>
+          <a:stretch>
+            <a:fillRect/>
+          </a:stretch>
+        </p:blipFill>
+        <p:spPr>
+          <a:xfrm>
+            <a:off x="685800" y="2514469"/>
+            <a:ext cx="4257675" cy="895350"/>
+          </a:xfrm>
+          <a:prstGeom prst="rect">
+            <a:avLst/>
+          </a:prstGeom>
+        </p:spPr>
+      </p:pic>
+    </p:spTree>
+    <p:extLst>
+      <p:ext uri="{BB962C8B-B14F-4D97-AF65-F5344CB8AC3E}">
+        <p14:creationId xmlns:p14="http://schemas.microsoft.com/office/powerpoint/2010/main" val="1667495316"/>
+      </p:ext>
+    </p:extLst>
+  </p:cSld>
+  <p:clrMapOvr>
+    <a:masterClrMapping/>
+  </p:clrMapOvr>
+</p:sld>
+</file>
+
+<file path=ppt/slides/slide8.xml><?xml version="1.0" encoding="utf-8"?>
+<p:sld xmlns:a="http://schemas.openxmlformats.org/drawingml/2006/main" xmlns:r="http://schemas.openxmlformats.org/officeDocument/2006/relationships" xmlns:p="http://schemas.openxmlformats.org/presentationml/2006/main">
+  <p:cSld>
+    <p:spTree>
+      <p:nvGrpSpPr>
+        <p:cNvPr id="1" name=""/>
+        <p:cNvGrpSpPr/>
+        <p:nvPr/>
+      </p:nvGrpSpPr>
+      <p:grpSpPr>
+        <a:xfrm>
+          <a:off x="0" y="0"/>
+          <a:ext cx="0" cy="0"/>
+          <a:chOff x="0" y="0"/>
+          <a:chExt cx="0" cy="0"/>
+        </a:xfrm>
+      </p:grpSpPr>
+      <p:sp>
+        <p:nvSpPr>
+          <p:cNvPr id="2" name="Title 1"/>
+          <p:cNvSpPr>
+            <a:spLocks noGrp="1"/>
+          </p:cNvSpPr>
+          <p:nvPr>
+            <p:ph type="title"/>
+          </p:nvPr>
+        </p:nvSpPr>
+        <p:spPr/>
+        <p:txBody>
+          <a:bodyPr/>
+          <a:lstStyle/>
+          <a:p>
+            <a:r>
+              <a:rPr lang="en-US" dirty="0" smtClean="0"/>
               <a:t>SPECFLOW Feature File SYNTAX</a:t>
             </a:r>
             <a:endParaRPr lang="en-US" dirty="0"/>
@@ -5985,7 +6582,7 @@
 </p:sld>
 </file>
 
-<file path=ppt/slides/slide8.xml><?xml version="1.0" encoding="utf-8"?>
+<file path=ppt/slides/slide9.xml><?xml version="1.0" encoding="utf-8"?>
 <p:sld xmlns:a="http://schemas.openxmlformats.org/drawingml/2006/main" xmlns:r="http://schemas.openxmlformats.org/officeDocument/2006/relationships" xmlns:p="http://schemas.openxmlformats.org/presentationml/2006/main">
   <p:cSld>
     <p:spTree>
@@ -6140,128 +6737,6 @@
     <p:extLst>
       <p:ext uri="{BB962C8B-B14F-4D97-AF65-F5344CB8AC3E}">
         <p14:creationId xmlns:p14="http://schemas.microsoft.com/office/powerpoint/2010/main" val="2496966235"/>
-      </p:ext>
-    </p:extLst>
-  </p:cSld>
-  <p:clrMapOvr>
-    <a:masterClrMapping/>
-  </p:clrMapOvr>
-</p:sld>
-</file>
-
-<file path=ppt/slides/slide9.xml><?xml version="1.0" encoding="utf-8"?>
-<p:sld xmlns:a="http://schemas.openxmlformats.org/drawingml/2006/main" xmlns:r="http://schemas.openxmlformats.org/officeDocument/2006/relationships" xmlns:p="http://schemas.openxmlformats.org/presentationml/2006/main">
-  <p:cSld>
-    <p:spTree>
-      <p:nvGrpSpPr>
-        <p:cNvPr id="1" name=""/>
-        <p:cNvGrpSpPr/>
-        <p:nvPr/>
-      </p:nvGrpSpPr>
-      <p:grpSpPr>
-        <a:xfrm>
-          <a:off x="0" y="0"/>
-          <a:ext cx="0" cy="0"/>
-          <a:chOff x="0" y="0"/>
-          <a:chExt cx="0" cy="0"/>
-        </a:xfrm>
-      </p:grpSpPr>
-      <p:sp>
-        <p:nvSpPr>
-          <p:cNvPr id="2" name="Title 1"/>
-          <p:cNvSpPr>
-            <a:spLocks noGrp="1"/>
-          </p:cNvSpPr>
-          <p:nvPr>
-            <p:ph type="title"/>
-          </p:nvPr>
-        </p:nvSpPr>
-        <p:spPr/>
-        <p:txBody>
-          <a:bodyPr/>
-          <a:lstStyle/>
-          <a:p>
-            <a:r>
-              <a:rPr lang="en-US" dirty="0" err="1" smtClean="0"/>
-              <a:t>SPECification</a:t>
-            </a:r>
-            <a:r>
-              <a:rPr lang="en-US" dirty="0" smtClean="0"/>
-              <a:t> tips</a:t>
-            </a:r>
-            <a:endParaRPr lang="en-US" dirty="0"/>
-          </a:p>
-        </p:txBody>
-      </p:sp>
-      <p:sp>
-        <p:nvSpPr>
-          <p:cNvPr id="3" name="Content Placeholder 2"/>
-          <p:cNvSpPr>
-            <a:spLocks noGrp="1"/>
-          </p:cNvSpPr>
-          <p:nvPr>
-            <p:ph idx="1"/>
-          </p:nvPr>
-        </p:nvSpPr>
-        <p:spPr/>
-        <p:txBody>
-          <a:bodyPr/>
-          <a:lstStyle/>
-          <a:p>
-            <a:r>
-              <a:rPr lang="en-US" dirty="0" smtClean="0"/>
-              <a:t>Specs are for the entire team, including the business</a:t>
-            </a:r>
-          </a:p>
-          <a:p>
-            <a:pPr lvl="1"/>
-            <a:r>
-              <a:rPr lang="en-US" dirty="0" smtClean="0"/>
-              <a:t>Declarative, not imperative</a:t>
-            </a:r>
-          </a:p>
-          <a:p>
-            <a:pPr marL="468630" lvl="1" indent="0">
-              <a:buNone/>
-            </a:pPr>
-            <a:endParaRPr lang="en-US" dirty="0" smtClean="0"/>
-          </a:p>
-          <a:p>
-            <a:pPr lvl="1"/>
-            <a:r>
-              <a:rPr lang="en-US" dirty="0" smtClean="0"/>
-              <a:t>The value of English Language specifications is that business and delivery teams are saying the same thing with the same words</a:t>
-            </a:r>
-          </a:p>
-          <a:p>
-            <a:pPr lvl="2"/>
-            <a:endParaRPr lang="en-US" dirty="0" smtClean="0"/>
-          </a:p>
-          <a:p>
-            <a:pPr lvl="1"/>
-            <a:r>
-              <a:rPr lang="en-US" dirty="0" smtClean="0"/>
-              <a:t>Push the how down </a:t>
-            </a:r>
-            <a:r>
-              <a:rPr lang="en-US" sz="1400" dirty="0" smtClean="0"/>
-              <a:t>[9]</a:t>
-            </a:r>
-          </a:p>
-          <a:p>
-            <a:pPr lvl="2"/>
-            <a:r>
-              <a:rPr lang="en-US" sz="1200" dirty="0" smtClean="0"/>
-              <a:t>How? – Now some code, finally</a:t>
-            </a:r>
-            <a:endParaRPr lang="en-US" sz="1200" dirty="0"/>
-          </a:p>
-        </p:txBody>
-      </p:sp>
-    </p:spTree>
-    <p:extLst>
-      <p:ext uri="{BB962C8B-B14F-4D97-AF65-F5344CB8AC3E}">
-        <p14:creationId xmlns:p14="http://schemas.microsoft.com/office/powerpoint/2010/main" val="881461922"/>
       </p:ext>
     </p:extLst>
   </p:cSld>

</xml_diff>

<commit_message>
Add some unimplemented steps for samples
</commit_message>
<xml_diff>
--- a/BCC2015_BDD-ES.pptx
+++ b/BCC2015_BDD-ES.pptx
@@ -227,7 +227,7 @@
           <a:p>
             <a:fld id="{CFF6C23A-1837-C145-845D-F9BF3DDC3584}" type="datetimeFigureOut">
               <a:rPr lang="en-US" smtClean="0"/>
-              <a:t>3/7/2015</a:t>
+              <a:t>3/21/2015</a:t>
             </a:fld>
             <a:endParaRPr lang="en-US"/>
           </a:p>
@@ -3612,7 +3612,50 @@
                   </a:schemeClr>
                 </a:solidFill>
               </a:rPr>
-              <a:t>BDD / Exec Specs / VS 2013 </a:t>
+              <a:t>BDD / Exec </a:t>
+            </a:r>
+            <a:r>
+              <a:rPr lang="en-US" sz="3100" dirty="0" smtClean="0">
+                <a:solidFill>
+                  <a:schemeClr val="tx2">
+                    <a:lumMod val="75000"/>
+                    <a:lumOff val="25000"/>
+                  </a:schemeClr>
+                </a:solidFill>
+              </a:rPr>
+              <a:t>Specs</a:t>
+            </a:r>
+            <a:br>
+              <a:rPr lang="en-US" sz="3100" dirty="0" smtClean="0">
+                <a:solidFill>
+                  <a:schemeClr val="tx2">
+                    <a:lumMod val="75000"/>
+                    <a:lumOff val="25000"/>
+                  </a:schemeClr>
+                </a:solidFill>
+              </a:rPr>
+            </a:br>
+            <a:r>
+              <a:rPr lang="en-US" sz="3100" dirty="0" smtClean="0">
+                <a:solidFill>
+                  <a:schemeClr val="tx2">
+                    <a:lumMod val="75000"/>
+                    <a:lumOff val="25000"/>
+                  </a:schemeClr>
+                </a:solidFill>
+              </a:rPr>
+              <a:t>VS </a:t>
+            </a:r>
+            <a:r>
+              <a:rPr lang="en-US" sz="3100" dirty="0">
+                <a:solidFill>
+                  <a:schemeClr val="tx2">
+                    <a:lumMod val="75000"/>
+                    <a:lumOff val="25000"/>
+                  </a:schemeClr>
+                </a:solidFill>
+              </a:rPr>
+              <a:t>2013 </a:t>
             </a:r>
           </a:p>
         </p:txBody>
@@ -3970,14 +4013,24 @@
           <a:lstStyle/>
           <a:p>
             <a:r>
-              <a:rPr lang="en-US" dirty="0" smtClean="0"/>
-              <a:t>Specification </a:t>
-            </a:r>
-            <a:r>
-              <a:rPr lang="en-US" dirty="0" smtClean="0"/>
-              <a:t>tips</a:t>
-            </a:r>
-            <a:endParaRPr lang="en-US" dirty="0"/>
+              <a:rPr lang="en-US" dirty="0" smtClean="0">
+                <a:solidFill>
+                  <a:schemeClr val="tx2">
+                    <a:lumMod val="75000"/>
+                    <a:lumOff val="25000"/>
+                  </a:schemeClr>
+                </a:solidFill>
+              </a:rPr>
+              <a:t>Specification tips</a:t>
+            </a:r>
+            <a:endParaRPr lang="en-US" dirty="0">
+              <a:solidFill>
+                <a:schemeClr val="tx2">
+                  <a:lumMod val="75000"/>
+                  <a:lumOff val="25000"/>
+                </a:schemeClr>
+              </a:solidFill>
+            </a:endParaRPr>
           </a:p>
         </p:txBody>
       </p:sp>
@@ -3997,49 +4050,88 @@
           <a:lstStyle/>
           <a:p>
             <a:r>
-              <a:rPr lang="en-US" dirty="0" smtClean="0"/>
+              <a:rPr lang="en-US" dirty="0" smtClean="0">
+                <a:solidFill>
+                  <a:schemeClr val="tx2">
+                    <a:lumMod val="75000"/>
+                    <a:lumOff val="25000"/>
+                  </a:schemeClr>
+                </a:solidFill>
+              </a:rPr>
               <a:t>Specs are for the entire team, including the business</a:t>
             </a:r>
           </a:p>
           <a:p>
             <a:r>
-              <a:rPr lang="en-US" dirty="0" smtClean="0"/>
-              <a:t>Declarative, not </a:t>
-            </a:r>
-            <a:r>
-              <a:rPr lang="en-US" dirty="0" smtClean="0"/>
-              <a:t>imperative</a:t>
-            </a:r>
-            <a:endParaRPr lang="en-US" dirty="0" smtClean="0"/>
-          </a:p>
-          <a:p>
-            <a:r>
-              <a:rPr lang="en-US" dirty="0" smtClean="0"/>
-              <a:t>The value of English Language specifications is that business and delivery teams are saying the same thing with the same </a:t>
-            </a:r>
-            <a:r>
-              <a:rPr lang="en-US" dirty="0" smtClean="0"/>
-              <a:t>words</a:t>
-            </a:r>
-            <a:endParaRPr lang="en-US" dirty="0" smtClean="0"/>
-          </a:p>
-          <a:p>
-            <a:r>
-              <a:rPr lang="en-US" dirty="0" smtClean="0"/>
+              <a:rPr lang="en-US" dirty="0" smtClean="0">
+                <a:solidFill>
+                  <a:schemeClr val="tx2">
+                    <a:lumMod val="75000"/>
+                    <a:lumOff val="25000"/>
+                  </a:schemeClr>
+                </a:solidFill>
+              </a:rPr>
+              <a:t>Declarative, not imperative</a:t>
+            </a:r>
+          </a:p>
+          <a:p>
+            <a:r>
+              <a:rPr lang="en-US" dirty="0" smtClean="0">
+                <a:solidFill>
+                  <a:schemeClr val="tx2">
+                    <a:lumMod val="75000"/>
+                    <a:lumOff val="25000"/>
+                  </a:schemeClr>
+                </a:solidFill>
+              </a:rPr>
+              <a:t>The value of English Language specifications is that business and delivery teams are saying the same thing with the same words</a:t>
+            </a:r>
+          </a:p>
+          <a:p>
+            <a:r>
+              <a:rPr lang="en-US" dirty="0" smtClean="0">
+                <a:solidFill>
+                  <a:schemeClr val="tx2">
+                    <a:lumMod val="75000"/>
+                    <a:lumOff val="25000"/>
+                  </a:schemeClr>
+                </a:solidFill>
+              </a:rPr>
               <a:t>Push the how down </a:t>
             </a:r>
             <a:r>
-              <a:rPr lang="en-US" sz="1400" dirty="0" smtClean="0"/>
+              <a:rPr lang="en-US" sz="1400" dirty="0" smtClean="0">
+                <a:solidFill>
+                  <a:schemeClr val="tx2">
+                    <a:lumMod val="75000"/>
+                    <a:lumOff val="25000"/>
+                  </a:schemeClr>
+                </a:solidFill>
+              </a:rPr>
               <a:t>[9]</a:t>
             </a:r>
           </a:p>
           <a:p>
             <a:pPr lvl="1"/>
             <a:r>
-              <a:rPr lang="en-US" dirty="0" smtClean="0"/>
+              <a:rPr lang="en-US" sz="1800" dirty="0" smtClean="0">
+                <a:solidFill>
+                  <a:schemeClr val="tx2">
+                    <a:lumMod val="75000"/>
+                    <a:lumOff val="25000"/>
+                  </a:schemeClr>
+                </a:solidFill>
+              </a:rPr>
               <a:t>How? – Now some code, finally</a:t>
             </a:r>
-            <a:endParaRPr lang="en-US" dirty="0"/>
+            <a:endParaRPr lang="en-US" sz="1800" dirty="0">
+              <a:solidFill>
+                <a:schemeClr val="tx2">
+                  <a:lumMod val="75000"/>
+                  <a:lumOff val="25000"/>
+                </a:schemeClr>
+              </a:solidFill>
+            </a:endParaRPr>
           </a:p>
         </p:txBody>
       </p:sp>
@@ -4089,14 +4181,24 @@
           <a:lstStyle/>
           <a:p>
             <a:r>
-              <a:rPr lang="en-US" dirty="0" smtClean="0"/>
-              <a:t>Stub </a:t>
-            </a:r>
-            <a:r>
-              <a:rPr lang="en-US" dirty="0" smtClean="0"/>
-              <a:t>generated code </a:t>
-            </a:r>
-            <a:endParaRPr lang="en-US" dirty="0"/>
+              <a:rPr lang="en-US" dirty="0" smtClean="0">
+                <a:solidFill>
+                  <a:schemeClr val="tx2">
+                    <a:lumMod val="75000"/>
+                    <a:lumOff val="25000"/>
+                  </a:schemeClr>
+                </a:solidFill>
+              </a:rPr>
+              <a:t>Stub generated code </a:t>
+            </a:r>
+            <a:endParaRPr lang="en-US" dirty="0">
+              <a:solidFill>
+                <a:schemeClr val="tx2">
+                  <a:lumMod val="75000"/>
+                  <a:lumOff val="25000"/>
+                </a:schemeClr>
+              </a:solidFill>
+            </a:endParaRPr>
           </a:p>
         </p:txBody>
       </p:sp>
@@ -5941,10 +6043,24 @@
           <a:lstStyle/>
           <a:p>
             <a:r>
-              <a:rPr lang="en-US" dirty="0" smtClean="0"/>
+              <a:rPr lang="en-US" dirty="0" smtClean="0">
+                <a:solidFill>
+                  <a:schemeClr val="tx2">
+                    <a:lumMod val="75000"/>
+                    <a:lumOff val="25000"/>
+                  </a:schemeClr>
+                </a:solidFill>
+              </a:rPr>
               <a:t>The Tools</a:t>
             </a:r>
-            <a:endParaRPr lang="en-US" dirty="0"/>
+            <a:endParaRPr lang="en-US" dirty="0">
+              <a:solidFill>
+                <a:schemeClr val="tx2">
+                  <a:lumMod val="75000"/>
+                  <a:lumOff val="25000"/>
+                </a:schemeClr>
+              </a:solidFill>
+            </a:endParaRPr>
           </a:p>
         </p:txBody>
       </p:sp>
@@ -6006,8 +6122,11 @@
                   </a:schemeClr>
                 </a:solidFill>
               </a:rPr>
-              <a:t>I’m Demoing </a:t>
-            </a:r>
+              <a:t>I’m Demoing with Visual Studio Ultimate</a:t>
+            </a:r>
+          </a:p>
+          <a:p>
+            <a:pPr lvl="1"/>
             <a:r>
               <a:rPr lang="en-US" dirty="0" smtClean="0">
                 <a:solidFill>
@@ -6017,43 +6136,7 @@
                   </a:schemeClr>
                 </a:solidFill>
               </a:rPr>
-              <a:t>with Visual Studio </a:t>
-            </a:r>
-            <a:r>
-              <a:rPr lang="en-US" dirty="0" smtClean="0">
-                <a:solidFill>
-                  <a:schemeClr val="tx2">
-                    <a:lumMod val="75000"/>
-                    <a:lumOff val="25000"/>
-                  </a:schemeClr>
-                </a:solidFill>
-              </a:rPr>
-              <a:t>Ultimate</a:t>
-            </a:r>
-          </a:p>
-          <a:p>
-            <a:pPr lvl="1"/>
-            <a:r>
-              <a:rPr lang="en-US" dirty="0" smtClean="0">
-                <a:solidFill>
-                  <a:schemeClr val="tx2">
-                    <a:lumMod val="75000"/>
-                    <a:lumOff val="25000"/>
-                  </a:schemeClr>
-                </a:solidFill>
-              </a:rPr>
-              <a:t>Link </a:t>
-            </a:r>
-            <a:r>
-              <a:rPr lang="en-US" dirty="0" smtClean="0">
-                <a:solidFill>
-                  <a:schemeClr val="tx2">
-                    <a:lumMod val="75000"/>
-                    <a:lumOff val="25000"/>
-                  </a:schemeClr>
-                </a:solidFill>
-              </a:rPr>
-              <a:t>is for Visual Studio Community</a:t>
+              <a:t>Link is for Visual Studio Community</a:t>
             </a:r>
           </a:p>
           <a:p>
@@ -6197,27 +6280,8 @@
                   </a:schemeClr>
                 </a:solidFill>
               </a:rPr>
-              <a:t>DOS </a:t>
-            </a:r>
-            <a:r>
-              <a:rPr lang="en-US" dirty="0" smtClean="0">
-                <a:solidFill>
-                  <a:schemeClr val="tx2">
-                    <a:lumMod val="75000"/>
-                    <a:lumOff val="25000"/>
-                  </a:schemeClr>
-                </a:solidFill>
-              </a:rPr>
-              <a:t>Batch (Probably should be PS)</a:t>
-            </a:r>
-            <a:endParaRPr lang="en-US" dirty="0" smtClean="0">
-              <a:solidFill>
-                <a:schemeClr val="tx2">
-                  <a:lumMod val="75000"/>
-                  <a:lumOff val="25000"/>
-                </a:schemeClr>
-              </a:solidFill>
-            </a:endParaRPr>
+              <a:t>DOS Batch (Probably should be PS)</a:t>
+            </a:r>
           </a:p>
           <a:p>
             <a:endParaRPr lang="en-US" dirty="0">
@@ -6277,10 +6341,24 @@
           <a:lstStyle/>
           <a:p>
             <a:r>
-              <a:rPr lang="en-US" dirty="0" smtClean="0"/>
+              <a:rPr lang="en-US" dirty="0" smtClean="0">
+                <a:solidFill>
+                  <a:schemeClr val="tx2">
+                    <a:lumMod val="75000"/>
+                    <a:lumOff val="25000"/>
+                  </a:schemeClr>
+                </a:solidFill>
+              </a:rPr>
               <a:t>SPECFLOW Installation</a:t>
             </a:r>
-            <a:endParaRPr lang="en-US" dirty="0"/>
+            <a:endParaRPr lang="en-US" dirty="0">
+              <a:solidFill>
+                <a:schemeClr val="tx2">
+                  <a:lumMod val="75000"/>
+                  <a:lumOff val="25000"/>
+                </a:schemeClr>
+              </a:solidFill>
+            </a:endParaRPr>
           </a:p>
         </p:txBody>
       </p:sp>
@@ -6300,7 +6378,14 @@
           <a:lstStyle/>
           <a:p>
             <a:r>
-              <a:rPr lang="en-US" dirty="0" smtClean="0"/>
+              <a:rPr lang="en-US" dirty="0" smtClean="0">
+                <a:solidFill>
+                  <a:schemeClr val="tx2">
+                    <a:lumMod val="75000"/>
+                    <a:lumOff val="25000"/>
+                  </a:schemeClr>
+                </a:solidFill>
+              </a:rPr>
               <a:t>VSIX</a:t>
             </a:r>
           </a:p>
@@ -6379,10 +6464,24 @@
           <a:lstStyle/>
           <a:p>
             <a:r>
-              <a:rPr lang="en-US" dirty="0" smtClean="0"/>
+              <a:rPr lang="en-US" dirty="0" smtClean="0">
+                <a:solidFill>
+                  <a:schemeClr val="tx2">
+                    <a:lumMod val="75000"/>
+                    <a:lumOff val="25000"/>
+                  </a:schemeClr>
+                </a:solidFill>
+              </a:rPr>
               <a:t>SPECFLOW Installation</a:t>
             </a:r>
-            <a:endParaRPr lang="en-US" dirty="0"/>
+            <a:endParaRPr lang="en-US" dirty="0">
+              <a:solidFill>
+                <a:schemeClr val="tx2">
+                  <a:lumMod val="75000"/>
+                  <a:lumOff val="25000"/>
+                </a:schemeClr>
+              </a:solidFill>
+            </a:endParaRPr>
           </a:p>
         </p:txBody>
       </p:sp>
@@ -6402,21 +6501,49 @@
           <a:lstStyle/>
           <a:p>
             <a:r>
-              <a:rPr lang="en-US" dirty="0" smtClean="0"/>
+              <a:rPr lang="en-US" dirty="0" smtClean="0">
+                <a:solidFill>
+                  <a:schemeClr val="tx2">
+                    <a:lumMod val="75000"/>
+                    <a:lumOff val="25000"/>
+                  </a:schemeClr>
+                </a:solidFill>
+              </a:rPr>
               <a:t>Decide which test runner to use</a:t>
             </a:r>
           </a:p>
           <a:p>
-            <a:endParaRPr lang="en-US" dirty="0"/>
-          </a:p>
-          <a:p>
-            <a:r>
-              <a:rPr lang="en-US" dirty="0" smtClean="0"/>
+            <a:endParaRPr lang="en-US" dirty="0">
+              <a:solidFill>
+                <a:schemeClr val="tx2">
+                  <a:lumMod val="75000"/>
+                  <a:lumOff val="25000"/>
+                </a:schemeClr>
+              </a:solidFill>
+            </a:endParaRPr>
+          </a:p>
+          <a:p>
+            <a:r>
+              <a:rPr lang="en-US" dirty="0" smtClean="0">
+                <a:solidFill>
+                  <a:schemeClr val="tx2">
+                    <a:lumMod val="75000"/>
+                    <a:lumOff val="25000"/>
+                  </a:schemeClr>
+                </a:solidFill>
+              </a:rPr>
               <a:t>NUGET PACKAGE</a:t>
             </a:r>
           </a:p>
           <a:p>
-            <a:endParaRPr lang="en-US" dirty="0"/>
+            <a:endParaRPr lang="en-US" dirty="0">
+              <a:solidFill>
+                <a:schemeClr val="tx2">
+                  <a:lumMod val="75000"/>
+                  <a:lumOff val="25000"/>
+                </a:schemeClr>
+              </a:solidFill>
+            </a:endParaRPr>
           </a:p>
         </p:txBody>
       </p:sp>
@@ -6490,10 +6617,24 @@
           <a:lstStyle/>
           <a:p>
             <a:r>
-              <a:rPr lang="en-US" dirty="0" smtClean="0"/>
+              <a:rPr lang="en-US" dirty="0" smtClean="0">
+                <a:solidFill>
+                  <a:schemeClr val="tx2">
+                    <a:lumMod val="75000"/>
+                    <a:lumOff val="25000"/>
+                  </a:schemeClr>
+                </a:solidFill>
+              </a:rPr>
               <a:t>SPECFLOW Feature File SYNTAX</a:t>
             </a:r>
-            <a:endParaRPr lang="en-US" dirty="0"/>
+            <a:endParaRPr lang="en-US" dirty="0">
+              <a:solidFill>
+                <a:schemeClr val="tx2">
+                  <a:lumMod val="75000"/>
+                  <a:lumOff val="25000"/>
+                </a:schemeClr>
+              </a:solidFill>
+            </a:endParaRPr>
           </a:p>
         </p:txBody>
       </p:sp>
@@ -6513,11 +6654,25 @@
           <a:lstStyle/>
           <a:p>
             <a:r>
-              <a:rPr lang="en-US" dirty="0" smtClean="0"/>
+              <a:rPr lang="en-US" dirty="0" smtClean="0">
+                <a:solidFill>
+                  <a:schemeClr val="tx2">
+                    <a:lumMod val="75000"/>
+                    <a:lumOff val="25000"/>
+                  </a:schemeClr>
+                </a:solidFill>
+              </a:rPr>
               <a:t>Utilizes Gherkin </a:t>
             </a:r>
             <a:r>
-              <a:rPr lang="en-US" sz="1400" dirty="0" smtClean="0"/>
+              <a:rPr lang="en-US" sz="1400" dirty="0" smtClean="0">
+                <a:solidFill>
+                  <a:schemeClr val="tx2">
+                    <a:lumMod val="75000"/>
+                    <a:lumOff val="25000"/>
+                  </a:schemeClr>
+                </a:solidFill>
+              </a:rPr>
               <a:t>[7]</a:t>
             </a:r>
           </a:p>
@@ -6525,23 +6680,58 @@
             <a:pPr marL="68580" indent="0">
               <a:buNone/>
             </a:pPr>
-            <a:endParaRPr lang="en-US" sz="1400" dirty="0" smtClean="0"/>
-          </a:p>
-          <a:p>
-            <a:r>
-              <a:rPr lang="en-US" dirty="0" smtClean="0"/>
+            <a:endParaRPr lang="en-US" sz="1400" dirty="0" smtClean="0">
+              <a:solidFill>
+                <a:schemeClr val="tx2">
+                  <a:lumMod val="75000"/>
+                  <a:lumOff val="25000"/>
+                </a:schemeClr>
+              </a:solidFill>
+            </a:endParaRPr>
+          </a:p>
+          <a:p>
+            <a:r>
+              <a:rPr lang="en-US" dirty="0" smtClean="0">
+                <a:solidFill>
+                  <a:schemeClr val="tx2">
+                    <a:lumMod val="75000"/>
+                    <a:lumOff val="25000"/>
+                  </a:schemeClr>
+                </a:solidFill>
+              </a:rPr>
               <a:t>Given … When … Then </a:t>
             </a:r>
             <a:r>
-              <a:rPr lang="en-US" sz="1400" dirty="0" smtClean="0"/>
+              <a:rPr lang="en-US" sz="1400" dirty="0" smtClean="0">
+                <a:solidFill>
+                  <a:schemeClr val="tx2">
+                    <a:lumMod val="75000"/>
+                    <a:lumOff val="25000"/>
+                  </a:schemeClr>
+                </a:solidFill>
+              </a:rPr>
               <a:t>[8]</a:t>
             </a:r>
           </a:p>
           <a:p>
-            <a:endParaRPr lang="en-US" dirty="0"/>
-          </a:p>
-          <a:p>
-            <a:endParaRPr lang="en-US" dirty="0"/>
+            <a:endParaRPr lang="en-US" dirty="0">
+              <a:solidFill>
+                <a:schemeClr val="tx2">
+                  <a:lumMod val="75000"/>
+                  <a:lumOff val="25000"/>
+                </a:schemeClr>
+              </a:solidFill>
+            </a:endParaRPr>
+          </a:p>
+          <a:p>
+            <a:endParaRPr lang="en-US" dirty="0">
+              <a:solidFill>
+                <a:schemeClr val="tx2">
+                  <a:lumMod val="75000"/>
+                  <a:lumOff val="25000"/>
+                </a:schemeClr>
+              </a:solidFill>
+            </a:endParaRPr>
           </a:p>
         </p:txBody>
       </p:sp>
@@ -6617,10 +6807,24 @@
           <a:lstStyle/>
           <a:p>
             <a:r>
-              <a:rPr lang="en-US" dirty="0" smtClean="0"/>
+              <a:rPr lang="en-US" dirty="0" smtClean="0">
+                <a:solidFill>
+                  <a:schemeClr val="tx2">
+                    <a:lumMod val="75000"/>
+                    <a:lumOff val="25000"/>
+                  </a:schemeClr>
+                </a:solidFill>
+              </a:rPr>
               <a:t>English language specifications</a:t>
             </a:r>
-            <a:endParaRPr lang="en-US" dirty="0"/>
+            <a:endParaRPr lang="en-US" dirty="0">
+              <a:solidFill>
+                <a:schemeClr val="tx2">
+                  <a:lumMod val="75000"/>
+                  <a:lumOff val="25000"/>
+                </a:schemeClr>
+              </a:solidFill>
+            </a:endParaRPr>
           </a:p>
         </p:txBody>
       </p:sp>
@@ -6636,11 +6840,19 @@
         </p:nvSpPr>
         <p:spPr/>
         <p:txBody>
-          <a:bodyPr/>
+          <a:bodyPr>
+            <a:normAutofit fontScale="92500" lnSpcReduction="10000"/>
+          </a:bodyPr>
           <a:lstStyle/>
           <a:p>
             <a:r>
               <a:rPr lang="en-US" dirty="0" smtClean="0">
+                <a:solidFill>
+                  <a:schemeClr val="tx2">
+                    <a:lumMod val="75000"/>
+                    <a:lumOff val="25000"/>
+                  </a:schemeClr>
+                </a:solidFill>
                 <a:latin typeface="Consolas" panose="020B0609020204030204" pitchFamily="49" charset="0"/>
                 <a:cs typeface="Consolas" panose="020B0609020204030204" pitchFamily="49" charset="0"/>
               </a:rPr>
@@ -6648,85 +6860,248 @@
             </a:r>
             <a:r>
               <a:rPr lang="en-US" dirty="0" err="1" smtClean="0">
+                <a:solidFill>
+                  <a:schemeClr val="tx2">
+                    <a:lumMod val="75000"/>
+                    <a:lumOff val="25000"/>
+                  </a:schemeClr>
+                </a:solidFill>
                 <a:latin typeface="Consolas" panose="020B0609020204030204" pitchFamily="49" charset="0"/>
                 <a:cs typeface="Consolas" panose="020B0609020204030204" pitchFamily="49" charset="0"/>
               </a:rPr>
-              <a:t>SomeLogicalGrouping</a:t>
+              <a:t>SomeLogicalFeatureGrouping</a:t>
             </a:r>
             <a:r>
               <a:rPr lang="en-US" dirty="0" smtClean="0">
+                <a:solidFill>
+                  <a:schemeClr val="tx2">
+                    <a:lumMod val="75000"/>
+                    <a:lumOff val="25000"/>
+                  </a:schemeClr>
+                </a:solidFill>
                 <a:latin typeface="Consolas" panose="020B0609020204030204" pitchFamily="49" charset="0"/>
                 <a:cs typeface="Consolas" panose="020B0609020204030204" pitchFamily="49" charset="0"/>
               </a:rPr>
-              <a:t> (optional)</a:t>
-            </a:r>
-          </a:p>
-          <a:p>
+              <a:t> </a:t>
+            </a:r>
             <a:r>
               <a:rPr lang="en-US" dirty="0" smtClean="0">
+                <a:solidFill>
+                  <a:schemeClr val="tx2">
+                    <a:lumMod val="75000"/>
+                    <a:lumOff val="25000"/>
+                  </a:schemeClr>
+                </a:solidFill>
                 <a:latin typeface="Consolas" panose="020B0609020204030204" pitchFamily="49" charset="0"/>
                 <a:cs typeface="Consolas" panose="020B0609020204030204" pitchFamily="49" charset="0"/>
               </a:rPr>
-              <a:t>Feature: Deliverable Unit</a:t>
-            </a:r>
-          </a:p>
-          <a:p>
-            <a:pPr lvl="1"/>
+              <a:t>(optional)</a:t>
+            </a:r>
+          </a:p>
+          <a:p>
             <a:r>
               <a:rPr lang="en-US" dirty="0" smtClean="0">
+                <a:solidFill>
+                  <a:schemeClr val="tx2">
+                    <a:lumMod val="75000"/>
+                    <a:lumOff val="25000"/>
+                  </a:schemeClr>
+                </a:solidFill>
                 <a:latin typeface="Consolas" panose="020B0609020204030204" pitchFamily="49" charset="0"/>
                 <a:cs typeface="Consolas" panose="020B0609020204030204" pitchFamily="49" charset="0"/>
               </a:rPr>
-              <a:t>User Story</a:t>
-            </a:r>
-          </a:p>
-          <a:p>
+              <a:t>Feature: Deliverable Unit</a:t>
+            </a:r>
+          </a:p>
+          <a:p>
+            <a:pPr lvl="1"/>
             <a:r>
               <a:rPr lang="en-US" dirty="0" smtClean="0">
+                <a:solidFill>
+                  <a:schemeClr val="tx2">
+                    <a:lumMod val="75000"/>
+                    <a:lumOff val="25000"/>
+                  </a:schemeClr>
+                </a:solidFill>
                 <a:latin typeface="Consolas" panose="020B0609020204030204" pitchFamily="49" charset="0"/>
                 <a:cs typeface="Consolas" panose="020B0609020204030204" pitchFamily="49" charset="0"/>
               </a:rPr>
-              <a:t>Scenario to be completed for the deliverable</a:t>
-            </a:r>
-          </a:p>
-          <a:p>
-            <a:pPr lvl="1"/>
+              <a:t>User </a:t>
+            </a:r>
             <a:r>
               <a:rPr lang="en-US" dirty="0" smtClean="0">
+                <a:solidFill>
+                  <a:schemeClr val="tx2">
+                    <a:lumMod val="75000"/>
+                    <a:lumOff val="25000"/>
+                  </a:schemeClr>
+                </a:solidFill>
                 <a:latin typeface="Consolas" panose="020B0609020204030204" pitchFamily="49" charset="0"/>
                 <a:cs typeface="Consolas" panose="020B0609020204030204" pitchFamily="49" charset="0"/>
               </a:rPr>
-              <a:t>Given: Initial state</a:t>
+              <a:t>Story</a:t>
             </a:r>
           </a:p>
           <a:p>
             <a:pPr lvl="1"/>
-            <a:r>
-              <a:rPr lang="en-US" dirty="0" smtClean="0">
-                <a:latin typeface="Consolas" panose="020B0609020204030204" pitchFamily="49" charset="0"/>
-                <a:cs typeface="Consolas" panose="020B0609020204030204" pitchFamily="49" charset="0"/>
-              </a:rPr>
-              <a:t>When: Action taken / system input</a:t>
-            </a:r>
-          </a:p>
-          <a:p>
-            <a:pPr lvl="1"/>
-            <a:r>
-              <a:rPr lang="en-US" dirty="0" smtClean="0">
-                <a:latin typeface="Consolas" panose="020B0609020204030204" pitchFamily="49" charset="0"/>
-                <a:cs typeface="Consolas" panose="020B0609020204030204" pitchFamily="49" charset="0"/>
-              </a:rPr>
-              <a:t>Then: Observable behavior</a:t>
-            </a:r>
-          </a:p>
-          <a:p>
             <a:endParaRPr lang="en-US" dirty="0">
+              <a:solidFill>
+                <a:schemeClr val="tx2">
+                  <a:lumMod val="75000"/>
+                  <a:lumOff val="25000"/>
+                </a:schemeClr>
+              </a:solidFill>
               <a:latin typeface="Consolas" panose="020B0609020204030204" pitchFamily="49" charset="0"/>
               <a:cs typeface="Consolas" panose="020B0609020204030204" pitchFamily="49" charset="0"/>
             </a:endParaRPr>
           </a:p>
           <a:p>
+            <a:r>
+              <a:rPr lang="en-US" dirty="0">
+                <a:solidFill>
+                  <a:schemeClr val="tx2">
+                    <a:lumMod val="75000"/>
+                    <a:lumOff val="25000"/>
+                  </a:schemeClr>
+                </a:solidFill>
+                <a:latin typeface="Consolas" panose="020B0609020204030204" pitchFamily="49" charset="0"/>
+                <a:cs typeface="Consolas" panose="020B0609020204030204" pitchFamily="49" charset="0"/>
+              </a:rPr>
+              <a:t>@</a:t>
+            </a:r>
+            <a:r>
+              <a:rPr lang="en-US" dirty="0" err="1">
+                <a:solidFill>
+                  <a:schemeClr val="tx2">
+                    <a:lumMod val="75000"/>
+                    <a:lumOff val="25000"/>
+                  </a:schemeClr>
+                </a:solidFill>
+                <a:latin typeface="Consolas" panose="020B0609020204030204" pitchFamily="49" charset="0"/>
+                <a:cs typeface="Consolas" panose="020B0609020204030204" pitchFamily="49" charset="0"/>
+              </a:rPr>
+              <a:t>SomeLogicalFeatureGrouping</a:t>
+            </a:r>
+            <a:r>
+              <a:rPr lang="en-US" dirty="0">
+                <a:solidFill>
+                  <a:schemeClr val="tx2">
+                    <a:lumMod val="75000"/>
+                    <a:lumOff val="25000"/>
+                  </a:schemeClr>
+                </a:solidFill>
+                <a:latin typeface="Consolas" panose="020B0609020204030204" pitchFamily="49" charset="0"/>
+                <a:cs typeface="Consolas" panose="020B0609020204030204" pitchFamily="49" charset="0"/>
+              </a:rPr>
+              <a:t> (optional</a:t>
+            </a:r>
+            <a:r>
+              <a:rPr lang="en-US" dirty="0" smtClean="0">
+                <a:solidFill>
+                  <a:schemeClr val="tx2">
+                    <a:lumMod val="75000"/>
+                    <a:lumOff val="25000"/>
+                  </a:schemeClr>
+                </a:solidFill>
+                <a:latin typeface="Consolas" panose="020B0609020204030204" pitchFamily="49" charset="0"/>
+                <a:cs typeface="Consolas" panose="020B0609020204030204" pitchFamily="49" charset="0"/>
+              </a:rPr>
+              <a:t>)</a:t>
+            </a:r>
+            <a:endParaRPr lang="en-US" dirty="0" smtClean="0">
+              <a:solidFill>
+                <a:schemeClr val="tx2">
+                  <a:lumMod val="75000"/>
+                  <a:lumOff val="25000"/>
+                </a:schemeClr>
+              </a:solidFill>
+              <a:latin typeface="Consolas" panose="020B0609020204030204" pitchFamily="49" charset="0"/>
+              <a:cs typeface="Consolas" panose="020B0609020204030204" pitchFamily="49" charset="0"/>
+            </a:endParaRPr>
+          </a:p>
+          <a:p>
+            <a:r>
+              <a:rPr lang="en-US" dirty="0" smtClean="0">
+                <a:solidFill>
+                  <a:schemeClr val="tx2">
+                    <a:lumMod val="75000"/>
+                    <a:lumOff val="25000"/>
+                  </a:schemeClr>
+                </a:solidFill>
+                <a:latin typeface="Consolas" panose="020B0609020204030204" pitchFamily="49" charset="0"/>
+                <a:cs typeface="Consolas" panose="020B0609020204030204" pitchFamily="49" charset="0"/>
+              </a:rPr>
+              <a:t>Scenario to be completed for the deliverable</a:t>
+            </a:r>
+          </a:p>
+          <a:p>
+            <a:pPr lvl="1"/>
+            <a:r>
+              <a:rPr lang="en-US" dirty="0" smtClean="0">
+                <a:solidFill>
+                  <a:schemeClr val="tx2">
+                    <a:lumMod val="75000"/>
+                    <a:lumOff val="25000"/>
+                  </a:schemeClr>
+                </a:solidFill>
+                <a:latin typeface="Consolas" panose="020B0609020204030204" pitchFamily="49" charset="0"/>
+                <a:cs typeface="Consolas" panose="020B0609020204030204" pitchFamily="49" charset="0"/>
+              </a:rPr>
+              <a:t>Given: Initial state</a:t>
+            </a:r>
+          </a:p>
+          <a:p>
+            <a:pPr lvl="1"/>
+            <a:r>
+              <a:rPr lang="en-US" dirty="0" smtClean="0">
+                <a:solidFill>
+                  <a:schemeClr val="tx2">
+                    <a:lumMod val="75000"/>
+                    <a:lumOff val="25000"/>
+                  </a:schemeClr>
+                </a:solidFill>
+                <a:latin typeface="Consolas" panose="020B0609020204030204" pitchFamily="49" charset="0"/>
+                <a:cs typeface="Consolas" panose="020B0609020204030204" pitchFamily="49" charset="0"/>
+              </a:rPr>
+              <a:t>When: Action taken / system input</a:t>
+            </a:r>
+          </a:p>
+          <a:p>
+            <a:pPr lvl="1"/>
+            <a:r>
+              <a:rPr lang="en-US" dirty="0" smtClean="0">
+                <a:solidFill>
+                  <a:schemeClr val="tx2">
+                    <a:lumMod val="75000"/>
+                    <a:lumOff val="25000"/>
+                  </a:schemeClr>
+                </a:solidFill>
+                <a:latin typeface="Consolas" panose="020B0609020204030204" pitchFamily="49" charset="0"/>
+                <a:cs typeface="Consolas" panose="020B0609020204030204" pitchFamily="49" charset="0"/>
+              </a:rPr>
+              <a:t>Then: Observable behavior</a:t>
+            </a:r>
+          </a:p>
+          <a:p>
             <a:endParaRPr lang="en-US" dirty="0">
+              <a:solidFill>
+                <a:schemeClr val="tx2">
+                  <a:lumMod val="75000"/>
+                  <a:lumOff val="25000"/>
+                </a:schemeClr>
+              </a:solidFill>
+              <a:latin typeface="Consolas" panose="020B0609020204030204" pitchFamily="49" charset="0"/>
+              <a:cs typeface="Consolas" panose="020B0609020204030204" pitchFamily="49" charset="0"/>
+            </a:endParaRPr>
+          </a:p>
+          <a:p>
+            <a:endParaRPr lang="en-US" dirty="0">
+              <a:solidFill>
+                <a:schemeClr val="tx2">
+                  <a:lumMod val="75000"/>
+                  <a:lumOff val="25000"/>
+                </a:schemeClr>
+              </a:solidFill>
               <a:latin typeface="Consolas" panose="020B0609020204030204" pitchFamily="49" charset="0"/>
               <a:cs typeface="Consolas" panose="020B0609020204030204" pitchFamily="49" charset="0"/>
             </a:endParaRPr>

</xml_diff>